<commit_message>
Added the revised update presentation
</commit_message>
<xml_diff>
--- a/documentation/Simple Scheduler Update Presentation.pptx
+++ b/documentation/Simple Scheduler Update Presentation.pptx
@@ -20,18 +20,20 @@
     <p:sldId id="265" r:id="rId15"/>
     <p:sldId id="266" r:id="rId16"/>
     <p:sldId id="267" r:id="rId17"/>
+    <p:sldId id="268" r:id="rId18"/>
+    <p:sldId id="269" r:id="rId19"/>
   </p:sldIdLst>
   <p:sldSz cy="5143500" cx="9144000"/>
   <p:notesSz cx="6858000" cy="9144000"/>
   <p:embeddedFontLst>
     <p:embeddedFont>
       <p:font typeface="Average"/>
-      <p:regular r:id="rId18"/>
+      <p:regular r:id="rId20"/>
     </p:embeddedFont>
     <p:embeddedFont>
       <p:font typeface="Oswald"/>
-      <p:regular r:id="rId19"/>
-      <p:bold r:id="rId20"/>
+      <p:regular r:id="rId21"/>
+      <p:bold r:id="rId22"/>
     </p:embeddedFont>
   </p:embeddedFontLst>
   <p:defaultTextStyle>
@@ -826,7 +828,7 @@
       </p:grpSpPr>
       <p:sp>
         <p:nvSpPr>
-          <p:cNvPr id="122" name="Google Shape;122;gd08a489436_0_140:notes"/>
+          <p:cNvPr id="122" name="Google Shape;122;gd08a489436_0_135:notes"/>
           <p:cNvSpPr/>
           <p:nvPr>
             <p:ph idx="2" type="sldImg"/>
@@ -861,7 +863,7 @@
       </p:sp>
       <p:sp>
         <p:nvSpPr>
-          <p:cNvPr id="123" name="Google Shape;123;gd08a489436_0_140:notes"/>
+          <p:cNvPr id="123" name="Google Shape;123;gd08a489436_0_135:notes"/>
           <p:cNvSpPr txBox="1"/>
           <p:nvPr>
             <p:ph idx="1" type="body"/>
@@ -911,7 +913,7 @@
   <p:cSld>
     <p:spTree>
       <p:nvGrpSpPr>
-        <p:cNvPr id="128" name="Shape 128"/>
+        <p:cNvPr id="129" name="Shape 129"/>
         <p:cNvGrpSpPr/>
         <p:nvPr/>
       </p:nvGrpSpPr>
@@ -925,7 +927,7 @@
       </p:grpSpPr>
       <p:sp>
         <p:nvSpPr>
-          <p:cNvPr id="129" name="Google Shape;129;gd08aab224b_0_7:notes"/>
+          <p:cNvPr id="130" name="Google Shape;130;gd099f9e274_0_1:notes"/>
           <p:cNvSpPr/>
           <p:nvPr>
             <p:ph idx="2" type="sldImg"/>
@@ -960,7 +962,7 @@
       </p:sp>
       <p:sp>
         <p:nvSpPr>
-          <p:cNvPr id="130" name="Google Shape;130;gd08aab224b_0_7:notes"/>
+          <p:cNvPr id="131" name="Google Shape;131;gd099f9e274_0_1:notes"/>
           <p:cNvSpPr txBox="1"/>
           <p:nvPr>
             <p:ph idx="1" type="body"/>
@@ -1010,7 +1012,7 @@
   <p:cSld>
     <p:spTree>
       <p:nvGrpSpPr>
-        <p:cNvPr id="135" name="Shape 135"/>
+        <p:cNvPr id="136" name="Shape 136"/>
         <p:cNvGrpSpPr/>
         <p:nvPr/>
       </p:nvGrpSpPr>
@@ -1024,7 +1026,7 @@
       </p:grpSpPr>
       <p:sp>
         <p:nvSpPr>
-          <p:cNvPr id="136" name="Google Shape;136;gd08aab224b_0_2:notes"/>
+          <p:cNvPr id="137" name="Google Shape;137;gd08aab224b_0_2:notes"/>
           <p:cNvSpPr/>
           <p:nvPr>
             <p:ph idx="2" type="sldImg"/>
@@ -1059,7 +1061,205 @@
       </p:sp>
       <p:sp>
         <p:nvSpPr>
-          <p:cNvPr id="137" name="Google Shape;137;gd08aab224b_0_2:notes"/>
+          <p:cNvPr id="138" name="Google Shape;138;gd08aab224b_0_2:notes"/>
+          <p:cNvSpPr txBox="1"/>
+          <p:nvPr>
+            <p:ph idx="1" type="body"/>
+          </p:nvPr>
+        </p:nvSpPr>
+        <p:spPr>
+          <a:xfrm>
+            <a:off x="685800" y="4343400"/>
+            <a:ext cx="5486400" cy="4114800"/>
+          </a:xfrm>
+          <a:prstGeom prst="rect">
+            <a:avLst/>
+          </a:prstGeom>
+        </p:spPr>
+        <p:txBody>
+          <a:bodyPr anchorCtr="0" anchor="t" bIns="91425" lIns="91425" spcFirstLastPara="1" rIns="91425" wrap="square" tIns="91425">
+            <a:noAutofit/>
+          </a:bodyPr>
+          <a:lstStyle/>
+          <a:p>
+            <a:pPr indent="0" lvl="0" marL="0" rtl="0" algn="l">
+              <a:spcBef>
+                <a:spcPts val="0"/>
+              </a:spcBef>
+              <a:spcAft>
+                <a:spcPts val="0"/>
+              </a:spcAft>
+              <a:buNone/>
+            </a:pPr>
+            <a:r>
+              <a:t/>
+            </a:r>
+            <a:endParaRPr/>
+          </a:p>
+        </p:txBody>
+      </p:sp>
+    </p:spTree>
+  </p:cSld>
+  <p:clrMapOvr>
+    <a:masterClrMapping/>
+  </p:clrMapOvr>
+</p:notes>
+</file>
+
+<file path=ppt/notesSlides/notesSlide13.xml><?xml version="1.0" encoding="utf-8"?>
+<p:notes xmlns:a="http://schemas.openxmlformats.org/drawingml/2006/main" xmlns:r="http://schemas.openxmlformats.org/officeDocument/2006/relationships" xmlns:mc="http://schemas.openxmlformats.org/markup-compatibility/2006" xmlns:mv="urn:schemas-microsoft-com:mac:vml" xmlns:p="http://schemas.openxmlformats.org/presentationml/2006/main" xmlns:c="http://schemas.openxmlformats.org/drawingml/2006/chart" xmlns:dgm="http://schemas.openxmlformats.org/drawingml/2006/diagram" xmlns:o="urn:schemas-microsoft-com:office:office" xmlns:v="urn:schemas-microsoft-com:vml" xmlns:pvml="urn:schemas-microsoft-com:office:powerpoint" xmlns:com="http://schemas.openxmlformats.org/drawingml/2006/compatibility" xmlns:p14="http://schemas.microsoft.com/office/powerpoint/2010/main" xmlns:p15="http://schemas.microsoft.com/office/powerpoint/2012/main" xmlns:ahyp="http://schemas.microsoft.com/office/drawing/2018/hyperlinkcolor" showMasterPhAnim="0" showMasterSp="0">
+  <p:cSld>
+    <p:spTree>
+      <p:nvGrpSpPr>
+        <p:cNvPr id="142" name="Shape 142"/>
+        <p:cNvGrpSpPr/>
+        <p:nvPr/>
+      </p:nvGrpSpPr>
+      <p:grpSpPr>
+        <a:xfrm>
+          <a:off x="0" y="0"/>
+          <a:ext cx="0" cy="0"/>
+          <a:chOff x="0" y="0"/>
+          <a:chExt cx="0" cy="0"/>
+        </a:xfrm>
+      </p:grpSpPr>
+      <p:sp>
+        <p:nvSpPr>
+          <p:cNvPr id="143" name="Google Shape;143;gcdafbe4e7d_0_2:notes"/>
+          <p:cNvSpPr/>
+          <p:nvPr>
+            <p:ph idx="2" type="sldImg"/>
+          </p:nvPr>
+        </p:nvSpPr>
+        <p:spPr>
+          <a:xfrm>
+            <a:off x="381300" y="685800"/>
+            <a:ext cx="6096000" cy="3429000"/>
+          </a:xfrm>
+          <a:custGeom>
+            <a:rect b="b" l="l" r="r" t="t"/>
+            <a:pathLst>
+              <a:path extrusionOk="0" h="120000" w="120000">
+                <a:moveTo>
+                  <a:pt x="0" y="0"/>
+                </a:moveTo>
+                <a:lnTo>
+                  <a:pt x="120000" y="0"/>
+                </a:lnTo>
+                <a:lnTo>
+                  <a:pt x="120000" y="120000"/>
+                </a:lnTo>
+                <a:lnTo>
+                  <a:pt x="0" y="120000"/>
+                </a:lnTo>
+                <a:close/>
+              </a:path>
+            </a:pathLst>
+          </a:custGeom>
+        </p:spPr>
+      </p:sp>
+      <p:sp>
+        <p:nvSpPr>
+          <p:cNvPr id="144" name="Google Shape;144;gcdafbe4e7d_0_2:notes"/>
+          <p:cNvSpPr txBox="1"/>
+          <p:nvPr>
+            <p:ph idx="1" type="body"/>
+          </p:nvPr>
+        </p:nvSpPr>
+        <p:spPr>
+          <a:xfrm>
+            <a:off x="685800" y="4343400"/>
+            <a:ext cx="5486400" cy="4114800"/>
+          </a:xfrm>
+          <a:prstGeom prst="rect">
+            <a:avLst/>
+          </a:prstGeom>
+        </p:spPr>
+        <p:txBody>
+          <a:bodyPr anchorCtr="0" anchor="t" bIns="91425" lIns="91425" spcFirstLastPara="1" rIns="91425" wrap="square" tIns="91425">
+            <a:noAutofit/>
+          </a:bodyPr>
+          <a:lstStyle/>
+          <a:p>
+            <a:pPr indent="0" lvl="0" marL="0" rtl="0" algn="l">
+              <a:spcBef>
+                <a:spcPts val="0"/>
+              </a:spcBef>
+              <a:spcAft>
+                <a:spcPts val="0"/>
+              </a:spcAft>
+              <a:buNone/>
+            </a:pPr>
+            <a:r>
+              <a:t/>
+            </a:r>
+            <a:endParaRPr/>
+          </a:p>
+        </p:txBody>
+      </p:sp>
+    </p:spTree>
+  </p:cSld>
+  <p:clrMapOvr>
+    <a:masterClrMapping/>
+  </p:clrMapOvr>
+</p:notes>
+</file>
+
+<file path=ppt/notesSlides/notesSlide14.xml><?xml version="1.0" encoding="utf-8"?>
+<p:notes xmlns:a="http://schemas.openxmlformats.org/drawingml/2006/main" xmlns:r="http://schemas.openxmlformats.org/officeDocument/2006/relationships" xmlns:mc="http://schemas.openxmlformats.org/markup-compatibility/2006" xmlns:mv="urn:schemas-microsoft-com:mac:vml" xmlns:p="http://schemas.openxmlformats.org/presentationml/2006/main" xmlns:c="http://schemas.openxmlformats.org/drawingml/2006/chart" xmlns:dgm="http://schemas.openxmlformats.org/drawingml/2006/diagram" xmlns:o="urn:schemas-microsoft-com:office:office" xmlns:v="urn:schemas-microsoft-com:vml" xmlns:pvml="urn:schemas-microsoft-com:office:powerpoint" xmlns:com="http://schemas.openxmlformats.org/drawingml/2006/compatibility" xmlns:p14="http://schemas.microsoft.com/office/powerpoint/2010/main" xmlns:p15="http://schemas.microsoft.com/office/powerpoint/2012/main" xmlns:ahyp="http://schemas.microsoft.com/office/drawing/2018/hyperlinkcolor" showMasterPhAnim="0" showMasterSp="0">
+  <p:cSld>
+    <p:spTree>
+      <p:nvGrpSpPr>
+        <p:cNvPr id="148" name="Shape 148"/>
+        <p:cNvGrpSpPr/>
+        <p:nvPr/>
+      </p:nvGrpSpPr>
+      <p:grpSpPr>
+        <a:xfrm>
+          <a:off x="0" y="0"/>
+          <a:ext cx="0" cy="0"/>
+          <a:chOff x="0" y="0"/>
+          <a:chExt cx="0" cy="0"/>
+        </a:xfrm>
+      </p:grpSpPr>
+      <p:sp>
+        <p:nvSpPr>
+          <p:cNvPr id="149" name="Google Shape;149;gcdb2c2feac_0_0:notes"/>
+          <p:cNvSpPr/>
+          <p:nvPr>
+            <p:ph idx="2" type="sldImg"/>
+          </p:nvPr>
+        </p:nvSpPr>
+        <p:spPr>
+          <a:xfrm>
+            <a:off x="381300" y="685800"/>
+            <a:ext cx="6096000" cy="3429000"/>
+          </a:xfrm>
+          <a:custGeom>
+            <a:rect b="b" l="l" r="r" t="t"/>
+            <a:pathLst>
+              <a:path extrusionOk="0" h="120000" w="120000">
+                <a:moveTo>
+                  <a:pt x="0" y="0"/>
+                </a:moveTo>
+                <a:lnTo>
+                  <a:pt x="120000" y="0"/>
+                </a:lnTo>
+                <a:lnTo>
+                  <a:pt x="120000" y="120000"/>
+                </a:lnTo>
+                <a:lnTo>
+                  <a:pt x="0" y="120000"/>
+                </a:lnTo>
+                <a:close/>
+              </a:path>
+            </a:pathLst>
+          </a:custGeom>
+        </p:spPr>
+      </p:sp>
+      <p:sp>
+        <p:nvSpPr>
+          <p:cNvPr id="150" name="Google Shape;150;gcdb2c2feac_0_0:notes"/>
           <p:cNvSpPr txBox="1"/>
           <p:nvPr>
             <p:ph idx="1" type="body"/>
@@ -1123,7 +1323,7 @@
       </p:grpSpPr>
       <p:sp>
         <p:nvSpPr>
-          <p:cNvPr id="62" name="Google Shape;62;gd090ad8a22_0_0:notes"/>
+          <p:cNvPr id="62" name="Google Shape;62;gd0ed0e1724_0_5:notes"/>
           <p:cNvSpPr/>
           <p:nvPr>
             <p:ph idx="2" type="sldImg"/>
@@ -1158,7 +1358,7 @@
       </p:sp>
       <p:sp>
         <p:nvSpPr>
-          <p:cNvPr id="63" name="Google Shape;63;gd090ad8a22_0_0:notes"/>
+          <p:cNvPr id="63" name="Google Shape;63;gd0ed0e1724_0_5:notes"/>
           <p:cNvSpPr txBox="1"/>
           <p:nvPr>
             <p:ph idx="1" type="body"/>
@@ -1208,7 +1408,7 @@
   <p:cSld>
     <p:spTree>
       <p:nvGrpSpPr>
-        <p:cNvPr id="69" name="Shape 69"/>
+        <p:cNvPr id="68" name="Shape 68"/>
         <p:cNvGrpSpPr/>
         <p:nvPr/>
       </p:nvGrpSpPr>
@@ -1222,7 +1422,7 @@
       </p:grpSpPr>
       <p:sp>
         <p:nvSpPr>
-          <p:cNvPr id="70" name="Google Shape;70;gd090ad8a22_0_7:notes"/>
+          <p:cNvPr id="69" name="Google Shape;69;gd08a489436_0_55:notes"/>
           <p:cNvSpPr/>
           <p:nvPr>
             <p:ph idx="2" type="sldImg"/>
@@ -1257,7 +1457,7 @@
       </p:sp>
       <p:sp>
         <p:nvSpPr>
-          <p:cNvPr id="71" name="Google Shape;71;gd090ad8a22_0_7:notes"/>
+          <p:cNvPr id="70" name="Google Shape;70;gd08a489436_0_55:notes"/>
           <p:cNvSpPr txBox="1"/>
           <p:nvPr>
             <p:ph idx="1" type="body"/>
@@ -1307,7 +1507,7 @@
   <p:cSld>
     <p:spTree>
       <p:nvGrpSpPr>
-        <p:cNvPr id="78" name="Shape 78"/>
+        <p:cNvPr id="76" name="Shape 76"/>
         <p:cNvGrpSpPr/>
         <p:nvPr/>
       </p:nvGrpSpPr>
@@ -1321,7 +1521,7 @@
       </p:grpSpPr>
       <p:sp>
         <p:nvSpPr>
-          <p:cNvPr id="79" name="Google Shape;79;gd08a489436_0_55:notes"/>
+          <p:cNvPr id="77" name="Google Shape;77;gd08a489436_0_140:notes"/>
           <p:cNvSpPr/>
           <p:nvPr>
             <p:ph idx="2" type="sldImg"/>
@@ -1356,7 +1556,7 @@
       </p:sp>
       <p:sp>
         <p:nvSpPr>
-          <p:cNvPr id="80" name="Google Shape;80;gd08a489436_0_55:notes"/>
+          <p:cNvPr id="78" name="Google Shape;78;gd08a489436_0_140:notes"/>
           <p:cNvSpPr txBox="1"/>
           <p:nvPr>
             <p:ph idx="1" type="body"/>
@@ -1406,7 +1606,7 @@
   <p:cSld>
     <p:spTree>
       <p:nvGrpSpPr>
-        <p:cNvPr id="85" name="Shape 85"/>
+        <p:cNvPr id="83" name="Shape 83"/>
         <p:cNvGrpSpPr/>
         <p:nvPr/>
       </p:nvGrpSpPr>
@@ -1420,7 +1620,7 @@
       </p:grpSpPr>
       <p:sp>
         <p:nvSpPr>
-          <p:cNvPr id="86" name="Google Shape;86;gd08a489436_0_120:notes"/>
+          <p:cNvPr id="84" name="Google Shape;84;gd08aab224b_0_7:notes"/>
           <p:cNvSpPr/>
           <p:nvPr>
             <p:ph idx="2" type="sldImg"/>
@@ -1455,7 +1655,7 @@
       </p:sp>
       <p:sp>
         <p:nvSpPr>
-          <p:cNvPr id="87" name="Google Shape;87;gd08a489436_0_120:notes"/>
+          <p:cNvPr id="85" name="Google Shape;85;gd08aab224b_0_7:notes"/>
           <p:cNvSpPr txBox="1"/>
           <p:nvPr>
             <p:ph idx="1" type="body"/>
@@ -1505,7 +1705,7 @@
   <p:cSld>
     <p:spTree>
       <p:nvGrpSpPr>
-        <p:cNvPr id="92" name="Shape 92"/>
+        <p:cNvPr id="90" name="Shape 90"/>
         <p:cNvGrpSpPr/>
         <p:nvPr/>
       </p:nvGrpSpPr>
@@ -1519,7 +1719,7 @@
       </p:grpSpPr>
       <p:sp>
         <p:nvSpPr>
-          <p:cNvPr id="93" name="Google Shape;93;gd08a489436_0_125:notes"/>
+          <p:cNvPr id="91" name="Google Shape;91;gd090ad8a22_0_0:notes"/>
           <p:cNvSpPr/>
           <p:nvPr>
             <p:ph idx="2" type="sldImg"/>
@@ -1554,7 +1754,7 @@
       </p:sp>
       <p:sp>
         <p:nvSpPr>
-          <p:cNvPr id="94" name="Google Shape;94;gd08a489436_0_125:notes"/>
+          <p:cNvPr id="92" name="Google Shape;92;gd090ad8a22_0_0:notes"/>
           <p:cNvSpPr txBox="1"/>
           <p:nvPr>
             <p:ph idx="1" type="body"/>
@@ -1604,7 +1804,7 @@
   <p:cSld>
     <p:spTree>
       <p:nvGrpSpPr>
-        <p:cNvPr id="99" name="Shape 99"/>
+        <p:cNvPr id="98" name="Shape 98"/>
         <p:cNvGrpSpPr/>
         <p:nvPr/>
       </p:nvGrpSpPr>
@@ -1618,7 +1818,7 @@
       </p:grpSpPr>
       <p:sp>
         <p:nvSpPr>
-          <p:cNvPr id="100" name="Google Shape;100;gd08a489436_0_130:notes"/>
+          <p:cNvPr id="99" name="Google Shape;99;gd090ad8a22_0_7:notes"/>
           <p:cNvSpPr/>
           <p:nvPr>
             <p:ph idx="2" type="sldImg"/>
@@ -1653,7 +1853,7 @@
       </p:sp>
       <p:sp>
         <p:nvSpPr>
-          <p:cNvPr id="101" name="Google Shape;101;gd08a489436_0_130:notes"/>
+          <p:cNvPr id="100" name="Google Shape;100;gd090ad8a22_0_7:notes"/>
           <p:cNvSpPr txBox="1"/>
           <p:nvPr>
             <p:ph idx="1" type="body"/>
@@ -1703,7 +1903,7 @@
   <p:cSld>
     <p:spTree>
       <p:nvGrpSpPr>
-        <p:cNvPr id="106" name="Shape 106"/>
+        <p:cNvPr id="107" name="Shape 107"/>
         <p:cNvGrpSpPr/>
         <p:nvPr/>
       </p:nvGrpSpPr>
@@ -1717,7 +1917,7 @@
       </p:grpSpPr>
       <p:sp>
         <p:nvSpPr>
-          <p:cNvPr id="107" name="Google Shape;107;gd08a489436_0_135:notes"/>
+          <p:cNvPr id="108" name="Google Shape;108;gd08a489436_0_125:notes"/>
           <p:cNvSpPr/>
           <p:nvPr>
             <p:ph idx="2" type="sldImg"/>
@@ -1752,7 +1952,7 @@
       </p:sp>
       <p:sp>
         <p:nvSpPr>
-          <p:cNvPr id="108" name="Google Shape;108;gd08a489436_0_135:notes"/>
+          <p:cNvPr id="109" name="Google Shape;109;gd08a489436_0_125:notes"/>
           <p:cNvSpPr txBox="1"/>
           <p:nvPr>
             <p:ph idx="1" type="body"/>
@@ -1816,7 +2016,7 @@
       </p:grpSpPr>
       <p:sp>
         <p:nvSpPr>
-          <p:cNvPr id="115" name="Google Shape;115;gd099f9e274_0_1:notes"/>
+          <p:cNvPr id="115" name="Google Shape;115;gd08a489436_0_130:notes"/>
           <p:cNvSpPr/>
           <p:nvPr>
             <p:ph idx="2" type="sldImg"/>
@@ -1851,7 +2051,7 @@
       </p:sp>
       <p:sp>
         <p:nvSpPr>
-          <p:cNvPr id="116" name="Google Shape;116;gd099f9e274_0_1:notes"/>
+          <p:cNvPr id="116" name="Google Shape;116;gd08a489436_0_130:notes"/>
           <p:cNvSpPr txBox="1"/>
           <p:nvPr>
             <p:ph idx="1" type="body"/>
@@ -7277,7 +7477,7 @@
             </a:pPr>
             <a:r>
               <a:rPr lang="en"/>
-              <a:t>Database: Completed</a:t>
+              <a:t>Settings</a:t>
             </a:r>
             <a:endParaRPr/>
           </a:p>
@@ -7294,7 +7494,7 @@
         <p:spPr>
           <a:xfrm>
             <a:off x="311700" y="1152475"/>
-            <a:ext cx="8520600" cy="3416400"/>
+            <a:ext cx="3375300" cy="3416400"/>
           </a:xfrm>
           <a:prstGeom prst="rect">
             <a:avLst/>
@@ -7306,24 +7506,23 @@
           </a:bodyPr>
           <a:lstStyle/>
           <a:p>
-            <a:pPr indent="-342900" lvl="0" marL="457200" rtl="0" algn="l">
-              <a:spcBef>
-                <a:spcPts val="0"/>
-              </a:spcBef>
-              <a:spcAft>
-                <a:spcPts val="0"/>
-              </a:spcAft>
-              <a:buSzPts val="1800"/>
-              <a:buChar char="●"/>
+            <a:pPr indent="0" lvl="0" marL="0" rtl="0" algn="l">
+              <a:spcBef>
+                <a:spcPts val="0"/>
+              </a:spcBef>
+              <a:spcAft>
+                <a:spcPts val="0"/>
+              </a:spcAft>
+              <a:buNone/>
             </a:pPr>
             <a:r>
               <a:rPr lang="en"/>
-              <a:t>Removal of old “database” class</a:t>
+              <a:t>Changes:</a:t>
             </a:r>
             <a:endParaRPr/>
           </a:p>
           <a:p>
-            <a:pPr indent="0" lvl="0" marL="457200" rtl="0" algn="l">
+            <a:pPr indent="0" lvl="0" marL="0" rtl="0" algn="l">
               <a:spcBef>
                 <a:spcPts val="1200"/>
               </a:spcBef>
@@ -7333,24 +7532,24 @@
               <a:buNone/>
             </a:pPr>
             <a:r>
-              <a:t/>
+              <a:rPr lang="en"/>
+              <a:t>-Some function parameters and return values have changed</a:t>
             </a:r>
             <a:endParaRPr/>
           </a:p>
           <a:p>
-            <a:pPr indent="-342900" lvl="0" marL="457200" rtl="0" algn="l">
+            <a:pPr indent="0" lvl="0" marL="0" rtl="0" algn="l">
               <a:spcBef>
                 <a:spcPts val="1200"/>
               </a:spcBef>
               <a:spcAft>
                 <a:spcPts val="0"/>
               </a:spcAft>
-              <a:buSzPts val="1800"/>
-              <a:buChar char="●"/>
+              <a:buNone/>
             </a:pPr>
             <a:r>
               <a:rPr lang="en"/>
-              <a:t>Added “DBHelper”</a:t>
+              <a:t>-notificationType has been split into notificationEmail and notificationPush</a:t>
             </a:r>
             <a:endParaRPr/>
           </a:p>
@@ -7371,9 +7570,55 @@
           </a:p>
         </p:txBody>
       </p:sp>
+      <p:sp>
+        <p:nvSpPr>
+          <p:cNvPr id="127" name="Google Shape;127;p22"/>
+          <p:cNvSpPr txBox="1"/>
+          <p:nvPr/>
+        </p:nvSpPr>
+        <p:spPr>
+          <a:xfrm>
+            <a:off x="4410150" y="3244825"/>
+            <a:ext cx="5786400" cy="400200"/>
+          </a:xfrm>
+          <a:prstGeom prst="rect">
+            <a:avLst/>
+          </a:prstGeom>
+          <a:noFill/>
+          <a:ln>
+            <a:noFill/>
+          </a:ln>
+        </p:spPr>
+        <p:txBody>
+          <a:bodyPr anchorCtr="0" anchor="t" bIns="91425" lIns="91425" spcFirstLastPara="1" rIns="91425" wrap="square" tIns="91425">
+            <a:spAutoFit/>
+          </a:bodyPr>
+          <a:lstStyle/>
+          <a:p>
+            <a:pPr indent="0" lvl="0" marL="0" rtl="0" algn="l">
+              <a:spcBef>
+                <a:spcPts val="0"/>
+              </a:spcBef>
+              <a:spcAft>
+                <a:spcPts val="0"/>
+              </a:spcAft>
+              <a:buNone/>
+            </a:pPr>
+            <a:r>
+              <a:t/>
+            </a:r>
+            <a:endParaRPr>
+              <a:latin typeface="Average"/>
+              <a:ea typeface="Average"/>
+              <a:cs typeface="Average"/>
+              <a:sym typeface="Average"/>
+            </a:endParaRPr>
+          </a:p>
+        </p:txBody>
+      </p:sp>
       <p:pic>
         <p:nvPicPr>
-          <p:cNvPr id="127" name="Google Shape;127;p22"/>
+          <p:cNvPr id="128" name="Google Shape;128;p22"/>
           <p:cNvPicPr preferRelativeResize="0"/>
           <p:nvPr/>
         </p:nvPicPr>
@@ -7387,8 +7632,8 @@
         </p:blipFill>
         <p:spPr>
           <a:xfrm>
-            <a:off x="4955613" y="1152475"/>
-            <a:ext cx="3876675" cy="2400300"/>
+            <a:off x="5254125" y="760720"/>
+            <a:ext cx="3375300" cy="3622067"/>
           </a:xfrm>
           <a:prstGeom prst="rect">
             <a:avLst/>
@@ -7412,7 +7657,7 @@
   <p:cSld>
     <p:spTree>
       <p:nvGrpSpPr>
-        <p:cNvPr id="131" name="Shape 131"/>
+        <p:cNvPr id="132" name="Shape 132"/>
         <p:cNvGrpSpPr/>
         <p:nvPr/>
       </p:nvGrpSpPr>
@@ -7426,7 +7671,7 @@
       </p:grpSpPr>
       <p:sp>
         <p:nvSpPr>
-          <p:cNvPr id="132" name="Google Shape;132;p23"/>
+          <p:cNvPr id="133" name="Google Shape;133;p23"/>
           <p:cNvSpPr txBox="1"/>
           <p:nvPr>
             <p:ph type="title"/>
@@ -7458,7 +7703,7 @@
             </a:pPr>
             <a:r>
               <a:rPr lang="en"/>
-              <a:t>Database: To Do</a:t>
+              <a:t>Settings</a:t>
             </a:r>
             <a:endParaRPr/>
           </a:p>
@@ -7466,45 +7711,100 @@
       </p:sp>
       <p:sp>
         <p:nvSpPr>
-          <p:cNvPr id="133" name="Google Shape;133;p23"/>
+          <p:cNvPr id="134" name="Google Shape;134;p23"/>
           <p:cNvSpPr txBox="1"/>
-          <p:nvPr>
-            <p:ph idx="1" type="body"/>
-          </p:nvPr>
+          <p:nvPr/>
         </p:nvSpPr>
         <p:spPr>
           <a:xfrm>
-            <a:off x="311700" y="1152475"/>
-            <a:ext cx="8520600" cy="3416400"/>
+            <a:off x="803675" y="1913575"/>
+            <a:ext cx="2431200" cy="1982400"/>
           </a:xfrm>
           <a:prstGeom prst="rect">
             <a:avLst/>
           </a:prstGeom>
+          <a:noFill/>
+          <a:ln>
+            <a:noFill/>
+          </a:ln>
         </p:spPr>
         <p:txBody>
           <a:bodyPr anchorCtr="0" anchor="t" bIns="91425" lIns="91425" spcFirstLastPara="1" rIns="91425" wrap="square" tIns="91425">
-            <a:normAutofit/>
+            <a:spAutoFit/>
           </a:bodyPr>
           <a:lstStyle/>
           <a:p>
-            <a:pPr indent="-342900" lvl="0" marL="457200" rtl="0" algn="l">
-              <a:spcBef>
-                <a:spcPts val="0"/>
-              </a:spcBef>
-              <a:spcAft>
-                <a:spcPts val="0"/>
-              </a:spcAft>
-              <a:buSzPts val="1800"/>
-              <a:buChar char="●"/>
+            <a:pPr indent="0" lvl="0" marL="0" rtl="0" algn="l">
+              <a:lnSpc>
+                <a:spcPct val="115000"/>
+              </a:lnSpc>
+              <a:spcBef>
+                <a:spcPts val="0"/>
+              </a:spcBef>
+              <a:spcAft>
+                <a:spcPts val="0"/>
+              </a:spcAft>
+              <a:buNone/>
             </a:pPr>
             <a:r>
-              <a:rPr lang="en"/>
-              <a:t>Create PHP script</a:t>
+              <a:rPr lang="en" sz="1800">
+                <a:solidFill>
+                  <a:schemeClr val="accent3"/>
+                </a:solidFill>
+                <a:latin typeface="Average"/>
+                <a:ea typeface="Average"/>
+                <a:cs typeface="Average"/>
+                <a:sym typeface="Average"/>
+              </a:rPr>
+              <a:t>To Do:</a:t>
             </a:r>
-            <a:endParaRPr/>
+            <a:endParaRPr sz="1800">
+              <a:solidFill>
+                <a:schemeClr val="accent3"/>
+              </a:solidFill>
+              <a:latin typeface="Average"/>
+              <a:ea typeface="Average"/>
+              <a:cs typeface="Average"/>
+              <a:sym typeface="Average"/>
+            </a:endParaRPr>
           </a:p>
           <a:p>
-            <a:pPr indent="0" lvl="0" marL="457200" rtl="0" algn="l">
+            <a:pPr indent="0" lvl="0" marL="0" rtl="0" algn="l">
+              <a:lnSpc>
+                <a:spcPct val="115000"/>
+              </a:lnSpc>
+              <a:spcBef>
+                <a:spcPts val="1200"/>
+              </a:spcBef>
+              <a:spcAft>
+                <a:spcPts val="0"/>
+              </a:spcAft>
+              <a:buNone/>
+            </a:pPr>
+            <a:r>
+              <a:rPr lang="en" sz="1800">
+                <a:solidFill>
+                  <a:schemeClr val="accent3"/>
+                </a:solidFill>
+                <a:latin typeface="Average"/>
+                <a:ea typeface="Average"/>
+                <a:cs typeface="Average"/>
+                <a:sym typeface="Average"/>
+              </a:rPr>
+              <a:t>-help, switchScreen, and googleSignIn are not yet implemented.</a:t>
+            </a:r>
+            <a:endParaRPr sz="1800">
+              <a:solidFill>
+                <a:schemeClr val="accent3"/>
+              </a:solidFill>
+              <a:latin typeface="Average"/>
+              <a:ea typeface="Average"/>
+              <a:cs typeface="Average"/>
+              <a:sym typeface="Average"/>
+            </a:endParaRPr>
+          </a:p>
+          <a:p>
+            <a:pPr indent="0" lvl="0" marL="0" rtl="0" algn="l">
               <a:spcBef>
                 <a:spcPts val="1200"/>
               </a:spcBef>
@@ -7516,45 +7816,18 @@
             <a:r>
               <a:t/>
             </a:r>
-            <a:endParaRPr/>
-          </a:p>
-          <a:p>
-            <a:pPr indent="-342900" lvl="0" marL="457200" rtl="0" algn="l">
-              <a:spcBef>
-                <a:spcPts val="1200"/>
-              </a:spcBef>
-              <a:spcAft>
-                <a:spcPts val="0"/>
-              </a:spcAft>
-              <a:buSzPts val="1800"/>
-              <a:buChar char="●"/>
-            </a:pPr>
-            <a:r>
-              <a:rPr lang="en"/>
-              <a:t>MySQL Synchronization event</a:t>
-            </a:r>
-            <a:endParaRPr/>
-          </a:p>
-          <a:p>
-            <a:pPr indent="0" lvl="0" marL="457200" rtl="0" algn="l">
-              <a:spcBef>
-                <a:spcPts val="1200"/>
-              </a:spcBef>
-              <a:spcAft>
-                <a:spcPts val="1200"/>
-              </a:spcAft>
-              <a:buNone/>
-            </a:pPr>
-            <a:r>
-              <a:t/>
-            </a:r>
-            <a:endParaRPr/>
+            <a:endParaRPr>
+              <a:latin typeface="Average"/>
+              <a:ea typeface="Average"/>
+              <a:cs typeface="Average"/>
+              <a:sym typeface="Average"/>
+            </a:endParaRPr>
           </a:p>
         </p:txBody>
       </p:sp>
       <p:pic>
         <p:nvPicPr>
-          <p:cNvPr id="134" name="Google Shape;134;p23"/>
+          <p:cNvPr id="135" name="Google Shape;135;p23"/>
           <p:cNvPicPr preferRelativeResize="0"/>
           <p:nvPr/>
         </p:nvPicPr>
@@ -7568,8 +7841,8 @@
         </p:blipFill>
         <p:spPr>
           <a:xfrm>
-            <a:off x="6152888" y="1152475"/>
-            <a:ext cx="1933575" cy="1638300"/>
+            <a:off x="5283951" y="356625"/>
+            <a:ext cx="2494225" cy="4430250"/>
           </a:xfrm>
           <a:prstGeom prst="rect">
             <a:avLst/>
@@ -7593,7 +7866,7 @@
   <p:cSld>
     <p:spTree>
       <p:nvGrpSpPr>
-        <p:cNvPr id="138" name="Shape 138"/>
+        <p:cNvPr id="139" name="Shape 139"/>
         <p:cNvGrpSpPr/>
         <p:nvPr/>
       </p:nvGrpSpPr>
@@ -7607,7 +7880,7 @@
       </p:grpSpPr>
       <p:sp>
         <p:nvSpPr>
-          <p:cNvPr id="139" name="Google Shape;139;p24"/>
+          <p:cNvPr id="140" name="Google Shape;140;p24"/>
           <p:cNvSpPr txBox="1"/>
           <p:nvPr>
             <p:ph type="title"/>
@@ -7615,7 +7888,7 @@
         </p:nvSpPr>
         <p:spPr>
           <a:xfrm>
-            <a:off x="311700" y="445025"/>
+            <a:off x="311700" y="0"/>
             <a:ext cx="8520600" cy="572700"/>
           </a:xfrm>
           <a:prstGeom prst="rect">
@@ -7647,7 +7920,7 @@
       </p:sp>
       <p:pic>
         <p:nvPicPr>
-          <p:cNvPr id="140" name="Google Shape;140;p24"/>
+          <p:cNvPr id="141" name="Google Shape;141;p24"/>
           <p:cNvPicPr preferRelativeResize="0"/>
           <p:nvPr/>
         </p:nvPicPr>
@@ -7661,8 +7934,8 @@
         </p:blipFill>
         <p:spPr>
           <a:xfrm>
-            <a:off x="809028" y="1017725"/>
-            <a:ext cx="7525934" cy="3959299"/>
+            <a:off x="155850" y="493575"/>
+            <a:ext cx="8832298" cy="4649925"/>
           </a:xfrm>
           <a:prstGeom prst="rect">
             <a:avLst/>
@@ -7673,6 +7946,296 @@
           </a:ln>
         </p:spPr>
       </p:pic>
+    </p:spTree>
+  </p:cSld>
+  <p:clrMapOvr>
+    <a:masterClrMapping/>
+  </p:clrMapOvr>
+</p:sld>
+</file>
+
+<file path=ppt/slides/slide13.xml><?xml version="1.0" encoding="utf-8"?>
+<p:sld xmlns:a="http://schemas.openxmlformats.org/drawingml/2006/main" xmlns:r="http://schemas.openxmlformats.org/officeDocument/2006/relationships" xmlns:mc="http://schemas.openxmlformats.org/markup-compatibility/2006" xmlns:mv="urn:schemas-microsoft-com:mac:vml" xmlns:p="http://schemas.openxmlformats.org/presentationml/2006/main" xmlns:c="http://schemas.openxmlformats.org/drawingml/2006/chart" xmlns:dgm="http://schemas.openxmlformats.org/drawingml/2006/diagram" xmlns:o="urn:schemas-microsoft-com:office:office" xmlns:v="urn:schemas-microsoft-com:vml" xmlns:pvml="urn:schemas-microsoft-com:office:powerpoint" xmlns:com="http://schemas.openxmlformats.org/drawingml/2006/compatibility" xmlns:p14="http://schemas.microsoft.com/office/powerpoint/2010/main" xmlns:p15="http://schemas.microsoft.com/office/powerpoint/2012/main" xmlns:ahyp="http://schemas.microsoft.com/office/drawing/2018/hyperlinkcolor">
+  <p:cSld>
+    <p:spTree>
+      <p:nvGrpSpPr>
+        <p:cNvPr id="145" name="Shape 145"/>
+        <p:cNvGrpSpPr/>
+        <p:nvPr/>
+      </p:nvGrpSpPr>
+      <p:grpSpPr>
+        <a:xfrm>
+          <a:off x="0" y="0"/>
+          <a:ext cx="0" cy="0"/>
+          <a:chOff x="0" y="0"/>
+          <a:chExt cx="0" cy="0"/>
+        </a:xfrm>
+      </p:grpSpPr>
+      <p:sp>
+        <p:nvSpPr>
+          <p:cNvPr id="146" name="Google Shape;146;p25"/>
+          <p:cNvSpPr txBox="1"/>
+          <p:nvPr>
+            <p:ph type="title"/>
+          </p:nvPr>
+        </p:nvSpPr>
+        <p:spPr>
+          <a:xfrm>
+            <a:off x="311700" y="445025"/>
+            <a:ext cx="8520600" cy="572700"/>
+          </a:xfrm>
+          <a:prstGeom prst="rect">
+            <a:avLst/>
+          </a:prstGeom>
+        </p:spPr>
+        <p:txBody>
+          <a:bodyPr anchorCtr="0" anchor="t" bIns="91425" lIns="91425" spcFirstLastPara="1" rIns="91425" wrap="square" tIns="91425">
+            <a:normAutofit fontScale="90000"/>
+          </a:bodyPr>
+          <a:lstStyle/>
+          <a:p>
+            <a:pPr indent="0" lvl="0" marL="0" rtl="0" algn="l">
+              <a:spcBef>
+                <a:spcPts val="0"/>
+              </a:spcBef>
+              <a:spcAft>
+                <a:spcPts val="0"/>
+              </a:spcAft>
+              <a:buNone/>
+            </a:pPr>
+            <a:r>
+              <a:rPr lang="en"/>
+              <a:t>Summary</a:t>
+            </a:r>
+            <a:endParaRPr/>
+          </a:p>
+        </p:txBody>
+      </p:sp>
+      <p:sp>
+        <p:nvSpPr>
+          <p:cNvPr id="147" name="Google Shape;147;p25"/>
+          <p:cNvSpPr txBox="1"/>
+          <p:nvPr>
+            <p:ph idx="1" type="body"/>
+          </p:nvPr>
+        </p:nvSpPr>
+        <p:spPr>
+          <a:xfrm>
+            <a:off x="311700" y="1152475"/>
+            <a:ext cx="8520600" cy="3416400"/>
+          </a:xfrm>
+          <a:prstGeom prst="rect">
+            <a:avLst/>
+          </a:prstGeom>
+        </p:spPr>
+        <p:txBody>
+          <a:bodyPr anchorCtr="0" anchor="t" bIns="91425" lIns="91425" spcFirstLastPara="1" rIns="91425" wrap="square" tIns="91425">
+            <a:normAutofit/>
+          </a:bodyPr>
+          <a:lstStyle/>
+          <a:p>
+            <a:pPr indent="-342900" lvl="0" marL="457200" rtl="0" algn="l">
+              <a:spcBef>
+                <a:spcPts val="0"/>
+              </a:spcBef>
+              <a:spcAft>
+                <a:spcPts val="0"/>
+              </a:spcAft>
+              <a:buSzPts val="1800"/>
+              <a:buChar char="●"/>
+            </a:pPr>
+            <a:r>
+              <a:rPr lang="en"/>
+              <a:t>Database</a:t>
+            </a:r>
+            <a:endParaRPr/>
+          </a:p>
+          <a:p>
+            <a:pPr indent="-317500" lvl="1" marL="914400" rtl="0" algn="l">
+              <a:spcBef>
+                <a:spcPts val="0"/>
+              </a:spcBef>
+              <a:spcAft>
+                <a:spcPts val="0"/>
+              </a:spcAft>
+              <a:buSzPts val="1400"/>
+              <a:buChar char="○"/>
+            </a:pPr>
+            <a:r>
+              <a:rPr lang="en"/>
+              <a:t>DBHelper, PHP script, SQL sync</a:t>
+            </a:r>
+            <a:endParaRPr/>
+          </a:p>
+          <a:p>
+            <a:pPr indent="-342900" lvl="0" marL="457200" rtl="0" algn="l">
+              <a:spcBef>
+                <a:spcPts val="0"/>
+              </a:spcBef>
+              <a:spcAft>
+                <a:spcPts val="0"/>
+              </a:spcAft>
+              <a:buSzPts val="1800"/>
+              <a:buChar char="●"/>
+            </a:pPr>
+            <a:r>
+              <a:rPr lang="en"/>
+              <a:t>Calendar</a:t>
+            </a:r>
+            <a:endParaRPr/>
+          </a:p>
+          <a:p>
+            <a:pPr indent="-317500" lvl="1" marL="914400" rtl="0" algn="l">
+              <a:spcBef>
+                <a:spcPts val="0"/>
+              </a:spcBef>
+              <a:spcAft>
+                <a:spcPts val="0"/>
+              </a:spcAft>
+              <a:buSzPts val="1400"/>
+              <a:buChar char="○"/>
+            </a:pPr>
+            <a:r>
+              <a:rPr lang="en"/>
+              <a:t>Changes in layout, Yearly view</a:t>
+            </a:r>
+            <a:endParaRPr/>
+          </a:p>
+          <a:p>
+            <a:pPr indent="-342900" lvl="0" marL="457200" rtl="0" algn="l">
+              <a:spcBef>
+                <a:spcPts val="0"/>
+              </a:spcBef>
+              <a:spcAft>
+                <a:spcPts val="0"/>
+              </a:spcAft>
+              <a:buSzPts val="1800"/>
+              <a:buChar char="●"/>
+            </a:pPr>
+            <a:r>
+              <a:rPr lang="en"/>
+              <a:t>Settings</a:t>
+            </a:r>
+            <a:endParaRPr/>
+          </a:p>
+          <a:p>
+            <a:pPr indent="-317500" lvl="1" marL="914400" rtl="0" algn="l">
+              <a:spcBef>
+                <a:spcPts val="0"/>
+              </a:spcBef>
+              <a:spcAft>
+                <a:spcPts val="0"/>
+              </a:spcAft>
+              <a:buSzPts val="1400"/>
+              <a:buChar char="○"/>
+            </a:pPr>
+            <a:r>
+              <a:rPr lang="en"/>
+              <a:t>Notifications, Google Sign-in</a:t>
+            </a:r>
+            <a:endParaRPr/>
+          </a:p>
+          <a:p>
+            <a:pPr indent="-342900" lvl="0" marL="457200" rtl="0" algn="l">
+              <a:spcBef>
+                <a:spcPts val="0"/>
+              </a:spcBef>
+              <a:spcAft>
+                <a:spcPts val="0"/>
+              </a:spcAft>
+              <a:buSzPts val="1800"/>
+              <a:buChar char="●"/>
+            </a:pPr>
+            <a:r>
+              <a:rPr lang="en"/>
+              <a:t>Main</a:t>
+            </a:r>
+            <a:endParaRPr/>
+          </a:p>
+          <a:p>
+            <a:pPr indent="-317500" lvl="1" marL="914400" rtl="0" algn="l">
+              <a:spcBef>
+                <a:spcPts val="0"/>
+              </a:spcBef>
+              <a:spcAft>
+                <a:spcPts val="0"/>
+              </a:spcAft>
+              <a:buSzPts val="1400"/>
+              <a:buChar char="○"/>
+            </a:pPr>
+            <a:r>
+              <a:rPr lang="en"/>
+              <a:t>Methods for settings, history</a:t>
+            </a:r>
+            <a:endParaRPr/>
+          </a:p>
+        </p:txBody>
+      </p:sp>
+    </p:spTree>
+  </p:cSld>
+  <p:clrMapOvr>
+    <a:masterClrMapping/>
+  </p:clrMapOvr>
+</p:sld>
+</file>
+
+<file path=ppt/slides/slide14.xml><?xml version="1.0" encoding="utf-8"?>
+<p:sld xmlns:a="http://schemas.openxmlformats.org/drawingml/2006/main" xmlns:r="http://schemas.openxmlformats.org/officeDocument/2006/relationships" xmlns:mc="http://schemas.openxmlformats.org/markup-compatibility/2006" xmlns:mv="urn:schemas-microsoft-com:mac:vml" xmlns:p="http://schemas.openxmlformats.org/presentationml/2006/main" xmlns:c="http://schemas.openxmlformats.org/drawingml/2006/chart" xmlns:dgm="http://schemas.openxmlformats.org/drawingml/2006/diagram" xmlns:o="urn:schemas-microsoft-com:office:office" xmlns:v="urn:schemas-microsoft-com:vml" xmlns:pvml="urn:schemas-microsoft-com:office:powerpoint" xmlns:com="http://schemas.openxmlformats.org/drawingml/2006/compatibility" xmlns:p14="http://schemas.microsoft.com/office/powerpoint/2010/main" xmlns:p15="http://schemas.microsoft.com/office/powerpoint/2012/main" xmlns:ahyp="http://schemas.microsoft.com/office/drawing/2018/hyperlinkcolor">
+  <p:cSld>
+    <p:spTree>
+      <p:nvGrpSpPr>
+        <p:cNvPr id="151" name="Shape 151"/>
+        <p:cNvGrpSpPr/>
+        <p:nvPr/>
+      </p:nvGrpSpPr>
+      <p:grpSpPr>
+        <a:xfrm>
+          <a:off x="0" y="0"/>
+          <a:ext cx="0" cy="0"/>
+          <a:chOff x="0" y="0"/>
+          <a:chExt cx="0" cy="0"/>
+        </a:xfrm>
+      </p:grpSpPr>
+      <p:sp>
+        <p:nvSpPr>
+          <p:cNvPr id="152" name="Google Shape;152;p26"/>
+          <p:cNvSpPr txBox="1"/>
+          <p:nvPr>
+            <p:ph type="title"/>
+          </p:nvPr>
+        </p:nvSpPr>
+        <p:spPr>
+          <a:xfrm>
+            <a:off x="671250" y="2141250"/>
+            <a:ext cx="7852200" cy="861000"/>
+          </a:xfrm>
+          <a:prstGeom prst="rect">
+            <a:avLst/>
+          </a:prstGeom>
+        </p:spPr>
+        <p:txBody>
+          <a:bodyPr anchorCtr="0" anchor="ctr" bIns="91425" lIns="91425" spcFirstLastPara="1" rIns="91425" wrap="square" tIns="91425">
+            <a:normAutofit/>
+          </a:bodyPr>
+          <a:lstStyle/>
+          <a:p>
+            <a:pPr indent="0" lvl="0" marL="0" rtl="0" algn="ctr">
+              <a:spcBef>
+                <a:spcPts val="0"/>
+              </a:spcBef>
+              <a:spcAft>
+                <a:spcPts val="0"/>
+              </a:spcAft>
+              <a:buNone/>
+            </a:pPr>
+            <a:r>
+              <a:rPr lang="en"/>
+              <a:t>Questions?</a:t>
+            </a:r>
+            <a:endParaRPr/>
+          </a:p>
+        </p:txBody>
+      </p:sp>
     </p:spTree>
   </p:cSld>
   <p:clrMapOvr>
@@ -7732,7 +8295,7 @@
             </a:pPr>
             <a:r>
               <a:rPr lang="en"/>
-              <a:t>Main</a:t>
+              <a:t>Outline</a:t>
             </a:r>
             <a:endParaRPr/>
           </a:p>
@@ -7749,7 +8312,7 @@
         <p:spPr>
           <a:xfrm>
             <a:off x="311700" y="1152475"/>
-            <a:ext cx="3999900" cy="3416400"/>
+            <a:ext cx="4260300" cy="3416400"/>
           </a:xfrm>
           <a:prstGeom prst="rect">
             <a:avLst/>
@@ -7772,10 +8335,10 @@
               <a:buChar char="●"/>
             </a:pPr>
             <a:r>
-              <a:rPr lang="en" sz="1800"/>
-              <a:t>Added fields for the settings button, database helper, and task list.</a:t>
+              <a:rPr lang="en"/>
+              <a:t>Backend</a:t>
             </a:r>
-            <a:endParaRPr sz="1800"/>
+            <a:endParaRPr/>
           </a:p>
           <a:p>
             <a:pPr indent="-342900" lvl="0" marL="457200" rtl="0" algn="l">
@@ -7789,10 +8352,14 @@
               <a:buChar char="●"/>
             </a:pPr>
             <a:r>
-              <a:rPr lang="en" sz="1800"/>
-              <a:t>onCreateOptionsMenu to bring up the add a task box.</a:t>
+              <a:rPr lang="en"/>
+              <a:t>List and </a:t>
             </a:r>
-            <a:endParaRPr sz="1800"/>
+            <a:r>
+              <a:rPr lang="en"/>
+              <a:t>History</a:t>
+            </a:r>
+            <a:endParaRPr/>
           </a:p>
           <a:p>
             <a:pPr indent="-342900" lvl="0" marL="457200" rtl="0" algn="l">
@@ -7806,27 +8373,14 @@
               <a:buChar char="●"/>
             </a:pPr>
             <a:r>
-              <a:rPr lang="en" sz="1800"/>
-              <a:t>onOptionsItemSelected to respond to user interactions of “add” or “cancel”</a:t>
+              <a:rPr lang="en"/>
+              <a:t>Calendar and </a:t>
             </a:r>
-            <a:endParaRPr sz="1800"/>
-          </a:p>
-          <a:p>
-            <a:pPr indent="-342900" lvl="0" marL="457200" rtl="0" algn="l">
-              <a:spcBef>
-                <a:spcPts val="0"/>
-              </a:spcBef>
-              <a:spcAft>
-                <a:spcPts val="0"/>
-              </a:spcAft>
-              <a:buSzPts val="1800"/>
-              <a:buChar char="●"/>
-            </a:pPr>
             <a:r>
-              <a:rPr lang="en" sz="1800"/>
-              <a:t>onClick for the settings button</a:t>
+              <a:rPr lang="en"/>
+              <a:t>Settings</a:t>
             </a:r>
-            <a:endParaRPr sz="1800"/>
+            <a:endParaRPr/>
           </a:p>
         </p:txBody>
       </p:sp>
@@ -7835,13 +8389,13 @@
           <p:cNvPr id="67" name="Google Shape;67;p14"/>
           <p:cNvSpPr txBox="1"/>
           <p:nvPr>
-            <p:ph idx="2" type="body"/>
+            <p:ph idx="1" type="body"/>
           </p:nvPr>
         </p:nvSpPr>
         <p:spPr>
           <a:xfrm>
-            <a:off x="4832400" y="1152475"/>
-            <a:ext cx="3999900" cy="3416400"/>
+            <a:off x="4572000" y="1152475"/>
+            <a:ext cx="4260300" cy="3416400"/>
           </a:xfrm>
           <a:prstGeom prst="rect">
             <a:avLst/>
@@ -7853,50 +8407,58 @@
           </a:bodyPr>
           <a:lstStyle/>
           <a:p>
-            <a:pPr indent="0" lvl="0" marL="0" rtl="0" algn="l">
-              <a:spcBef>
-                <a:spcPts val="0"/>
-              </a:spcBef>
-              <a:spcAft>
-                <a:spcPts val="1200"/>
-              </a:spcAft>
-              <a:buNone/>
+            <a:pPr indent="-342900" lvl="0" marL="457200" rtl="0" algn="l">
+              <a:spcBef>
+                <a:spcPts val="0"/>
+              </a:spcBef>
+              <a:spcAft>
+                <a:spcPts val="0"/>
+              </a:spcAft>
+              <a:buSzPts val="1800"/>
+              <a:buChar char="●"/>
             </a:pPr>
             <a:r>
-              <a:t/>
+              <a:rPr lang="en"/>
+              <a:t>Changes</a:t>
+            </a:r>
+            <a:endParaRPr/>
+          </a:p>
+          <a:p>
+            <a:pPr indent="-342900" lvl="0" marL="457200" rtl="0" algn="l">
+              <a:spcBef>
+                <a:spcPts val="0"/>
+              </a:spcBef>
+              <a:spcAft>
+                <a:spcPts val="0"/>
+              </a:spcAft>
+              <a:buSzPts val="1800"/>
+              <a:buChar char="●"/>
+            </a:pPr>
+            <a:r>
+              <a:rPr lang="en"/>
+              <a:t>Completed</a:t>
+            </a:r>
+            <a:endParaRPr/>
+          </a:p>
+          <a:p>
+            <a:pPr indent="-342900" lvl="0" marL="457200" rtl="0" algn="l">
+              <a:spcBef>
+                <a:spcPts val="0"/>
+              </a:spcBef>
+              <a:spcAft>
+                <a:spcPts val="0"/>
+              </a:spcAft>
+              <a:buSzPts val="1800"/>
+              <a:buChar char="●"/>
+            </a:pPr>
+            <a:r>
+              <a:rPr lang="en"/>
+              <a:t>To do</a:t>
             </a:r>
             <a:endParaRPr/>
           </a:p>
         </p:txBody>
       </p:sp>
-      <p:pic>
-        <p:nvPicPr>
-          <p:cNvPr id="68" name="Google Shape;68;p14"/>
-          <p:cNvPicPr preferRelativeResize="0"/>
-          <p:nvPr/>
-        </p:nvPicPr>
-        <p:blipFill>
-          <a:blip r:embed="rId3">
-            <a:alphaModFix/>
-          </a:blip>
-          <a:stretch>
-            <a:fillRect/>
-          </a:stretch>
-        </p:blipFill>
-        <p:spPr>
-          <a:xfrm>
-            <a:off x="4631763" y="1184275"/>
-            <a:ext cx="4200525" cy="3352800"/>
-          </a:xfrm>
-          <a:prstGeom prst="rect">
-            <a:avLst/>
-          </a:prstGeom>
-          <a:noFill/>
-          <a:ln>
-            <a:noFill/>
-          </a:ln>
-        </p:spPr>
-      </p:pic>
     </p:spTree>
   </p:cSld>
   <p:clrMapOvr>
@@ -7910,7 +8472,7 @@
   <p:cSld>
     <p:spTree>
       <p:nvGrpSpPr>
-        <p:cNvPr id="72" name="Shape 72"/>
+        <p:cNvPr id="71" name="Shape 71"/>
         <p:cNvGrpSpPr/>
         <p:nvPr/>
       </p:nvGrpSpPr>
@@ -7924,7 +8486,7 @@
       </p:grpSpPr>
       <p:sp>
         <p:nvSpPr>
-          <p:cNvPr id="73" name="Google Shape;73;p15"/>
+          <p:cNvPr id="72" name="Google Shape;72;p15"/>
           <p:cNvSpPr txBox="1"/>
           <p:nvPr>
             <p:ph type="title"/>
@@ -7956,7 +8518,7 @@
             </a:pPr>
             <a:r>
               <a:rPr lang="en"/>
-              <a:t>Main: To do</a:t>
+              <a:t>Task and Category Changes</a:t>
             </a:r>
             <a:endParaRPr/>
           </a:p>
@@ -7964,7 +8526,7 @@
       </p:sp>
       <p:sp>
         <p:nvSpPr>
-          <p:cNvPr id="74" name="Google Shape;74;p15"/>
+          <p:cNvPr id="73" name="Google Shape;73;p15"/>
           <p:cNvSpPr txBox="1"/>
           <p:nvPr>
             <p:ph idx="1" type="body"/>
@@ -7973,7 +8535,7 @@
         <p:spPr>
           <a:xfrm>
             <a:off x="311700" y="1152475"/>
-            <a:ext cx="3999900" cy="3416400"/>
+            <a:ext cx="8520600" cy="3416400"/>
           </a:xfrm>
           <a:prstGeom prst="rect">
             <a:avLst/>
@@ -7996,15 +8558,30 @@
               <a:buChar char="●"/>
             </a:pPr>
             <a:r>
-              <a:rPr lang="en" sz="1800"/>
-              <a:t>Add the remaining fields when adding tasks.</a:t>
+              <a:rPr lang="en"/>
+              <a:t>Removal of old “TaskList” and “CategoryList” classes</a:t>
             </a:r>
-            <a:endParaRPr sz="1800"/>
+            <a:endParaRPr/>
+          </a:p>
+          <a:p>
+            <a:pPr indent="0" lvl="0" marL="0" rtl="0" algn="l">
+              <a:spcBef>
+                <a:spcPts val="1200"/>
+              </a:spcBef>
+              <a:spcAft>
+                <a:spcPts val="0"/>
+              </a:spcAft>
+              <a:buNone/>
+            </a:pPr>
+            <a:r>
+              <a:t/>
+            </a:r>
+            <a:endParaRPr/>
           </a:p>
           <a:p>
             <a:pPr indent="-342900" lvl="0" marL="457200" rtl="0" algn="l">
               <a:spcBef>
-                <a:spcPts val="0"/>
+                <a:spcPts val="1200"/>
               </a:spcBef>
               <a:spcAft>
                 <a:spcPts val="0"/>
@@ -8013,15 +8590,30 @@
               <a:buChar char="●"/>
             </a:pPr>
             <a:r>
-              <a:rPr lang="en" sz="1800"/>
-              <a:t>Add a method to update UI after adding a task. </a:t>
+              <a:rPr lang="en"/>
+              <a:t>Added task_list.xml file for the add a task button</a:t>
             </a:r>
-            <a:endParaRPr sz="1800"/>
+            <a:endParaRPr/>
+          </a:p>
+          <a:p>
+            <a:pPr indent="0" lvl="0" marL="0" rtl="0" algn="l">
+              <a:spcBef>
+                <a:spcPts val="1200"/>
+              </a:spcBef>
+              <a:spcAft>
+                <a:spcPts val="0"/>
+              </a:spcAft>
+              <a:buNone/>
+            </a:pPr>
+            <a:r>
+              <a:t/>
+            </a:r>
+            <a:endParaRPr/>
           </a:p>
           <a:p>
             <a:pPr indent="-342900" lvl="0" marL="457200" rtl="0" algn="l">
               <a:spcBef>
-                <a:spcPts val="0"/>
+                <a:spcPts val="1200"/>
               </a:spcBef>
               <a:spcAft>
                 <a:spcPts val="0"/>
@@ -8030,47 +8622,8 @@
               <a:buChar char="●"/>
             </a:pPr>
             <a:r>
-              <a:rPr lang="en" sz="1800"/>
-              <a:t>Change button for completion to an interaction when selecting a task.</a:t>
-            </a:r>
-            <a:endParaRPr sz="1800"/>
-          </a:p>
-        </p:txBody>
-      </p:sp>
-      <p:sp>
-        <p:nvSpPr>
-          <p:cNvPr id="75" name="Google Shape;75;p15"/>
-          <p:cNvSpPr txBox="1"/>
-          <p:nvPr>
-            <p:ph idx="2" type="body"/>
-          </p:nvPr>
-        </p:nvSpPr>
-        <p:spPr>
-          <a:xfrm>
-            <a:off x="4832400" y="1152475"/>
-            <a:ext cx="3999900" cy="3416400"/>
-          </a:xfrm>
-          <a:prstGeom prst="rect">
-            <a:avLst/>
-          </a:prstGeom>
-        </p:spPr>
-        <p:txBody>
-          <a:bodyPr anchorCtr="0" anchor="t" bIns="91425" lIns="91425" spcFirstLastPara="1" rIns="91425" wrap="square" tIns="91425">
-            <a:normAutofit/>
-          </a:bodyPr>
-          <a:lstStyle/>
-          <a:p>
-            <a:pPr indent="0" lvl="0" marL="0" rtl="0" algn="l">
-              <a:spcBef>
-                <a:spcPts val="0"/>
-              </a:spcBef>
-              <a:spcAft>
-                <a:spcPts val="1200"/>
-              </a:spcAft>
-              <a:buNone/>
-            </a:pPr>
-            <a:r>
-              <a:t/>
+              <a:rPr lang="en"/>
+              <a:t>“Recur” field now an enum</a:t>
             </a:r>
             <a:endParaRPr/>
           </a:p>
@@ -8078,7 +8631,7 @@
       </p:sp>
       <p:pic>
         <p:nvPicPr>
-          <p:cNvPr id="76" name="Google Shape;76;p15"/>
+          <p:cNvPr id="74" name="Google Shape;74;p15"/>
           <p:cNvPicPr preferRelativeResize="0"/>
           <p:nvPr/>
         </p:nvPicPr>
@@ -8092,8 +8645,8 @@
         </p:blipFill>
         <p:spPr>
           <a:xfrm>
-            <a:off x="6850013" y="767324"/>
-            <a:ext cx="2073950" cy="3867601"/>
+            <a:off x="6467949" y="289600"/>
+            <a:ext cx="2364350" cy="4564300"/>
           </a:xfrm>
           <a:prstGeom prst="rect">
             <a:avLst/>
@@ -8106,7 +8659,7 @@
       </p:pic>
       <p:pic>
         <p:nvPicPr>
-          <p:cNvPr id="77" name="Google Shape;77;p15"/>
+          <p:cNvPr id="75" name="Google Shape;75;p15"/>
           <p:cNvPicPr preferRelativeResize="0"/>
           <p:nvPr/>
         </p:nvPicPr>
@@ -8120,8 +8673,8 @@
         </p:blipFill>
         <p:spPr>
           <a:xfrm>
-            <a:off x="4580679" y="781026"/>
-            <a:ext cx="2000259" cy="3840199"/>
+            <a:off x="3818325" y="3739463"/>
+            <a:ext cx="2085975" cy="1114425"/>
           </a:xfrm>
           <a:prstGeom prst="rect">
             <a:avLst/>
@@ -8145,7 +8698,7 @@
   <p:cSld>
     <p:spTree>
       <p:nvGrpSpPr>
-        <p:cNvPr id="81" name="Shape 81"/>
+        <p:cNvPr id="79" name="Shape 79"/>
         <p:cNvGrpSpPr/>
         <p:nvPr/>
       </p:nvGrpSpPr>
@@ -8159,7 +8712,7 @@
       </p:grpSpPr>
       <p:sp>
         <p:nvSpPr>
-          <p:cNvPr id="82" name="Google Shape;82;p16"/>
+          <p:cNvPr id="80" name="Google Shape;80;p16"/>
           <p:cNvSpPr txBox="1"/>
           <p:nvPr>
             <p:ph type="title"/>
@@ -8191,7 +8744,7 @@
             </a:pPr>
             <a:r>
               <a:rPr lang="en"/>
-              <a:t>Task/Task List</a:t>
+              <a:t>Database</a:t>
             </a:r>
             <a:endParaRPr/>
           </a:p>
@@ -8199,7 +8752,7 @@
       </p:sp>
       <p:sp>
         <p:nvSpPr>
-          <p:cNvPr id="83" name="Google Shape;83;p16"/>
+          <p:cNvPr id="81" name="Google Shape;81;p16"/>
           <p:cNvSpPr txBox="1"/>
           <p:nvPr>
             <p:ph idx="1" type="body"/>
@@ -8232,12 +8785,12 @@
             </a:pPr>
             <a:r>
               <a:rPr lang="en"/>
-              <a:t>Removal of old “TaskList” class</a:t>
+              <a:t>Removal of old “database” class</a:t>
             </a:r>
             <a:endParaRPr/>
           </a:p>
           <a:p>
-            <a:pPr indent="0" lvl="0" marL="0" rtl="0" algn="l">
+            <a:pPr indent="0" lvl="0" marL="457200" rtl="0" algn="l">
               <a:spcBef>
                 <a:spcPts val="1200"/>
               </a:spcBef>
@@ -8264,7 +8817,7 @@
             </a:pPr>
             <a:r>
               <a:rPr lang="en"/>
-              <a:t>Added task_list.xml file for the add a task button</a:t>
+              <a:t>Added “DBHelper”</a:t>
             </a:r>
             <a:endParaRPr/>
           </a:p>
@@ -8274,29 +8827,12 @@
                 <a:spcPts val="1200"/>
               </a:spcBef>
               <a:spcAft>
-                <a:spcPts val="0"/>
+                <a:spcPts val="1200"/>
               </a:spcAft>
               <a:buNone/>
             </a:pPr>
             <a:r>
               <a:t/>
-            </a:r>
-            <a:endParaRPr/>
-          </a:p>
-          <a:p>
-            <a:pPr indent="-342900" lvl="0" marL="457200" rtl="0" algn="l">
-              <a:spcBef>
-                <a:spcPts val="1200"/>
-              </a:spcBef>
-              <a:spcAft>
-                <a:spcPts val="0"/>
-              </a:spcAft>
-              <a:buSzPts val="1800"/>
-              <a:buChar char="●"/>
-            </a:pPr>
-            <a:r>
-              <a:rPr lang="en"/>
-              <a:t>“Recur” field now an enum</a:t>
             </a:r>
             <a:endParaRPr/>
           </a:p>
@@ -8304,7 +8840,7 @@
       </p:sp>
       <p:pic>
         <p:nvPicPr>
-          <p:cNvPr id="84" name="Google Shape;84;p16"/>
+          <p:cNvPr id="82" name="Google Shape;82;p16"/>
           <p:cNvPicPr preferRelativeResize="0"/>
           <p:nvPr/>
         </p:nvPicPr>
@@ -8318,8 +8854,8 @@
         </p:blipFill>
         <p:spPr>
           <a:xfrm>
-            <a:off x="5998599" y="368650"/>
-            <a:ext cx="2364350" cy="4564300"/>
+            <a:off x="4955613" y="1152475"/>
+            <a:ext cx="3876675" cy="2400300"/>
           </a:xfrm>
           <a:prstGeom prst="rect">
             <a:avLst/>
@@ -8343,7 +8879,7 @@
   <p:cSld>
     <p:spTree>
       <p:nvGrpSpPr>
-        <p:cNvPr id="88" name="Shape 88"/>
+        <p:cNvPr id="86" name="Shape 86"/>
         <p:cNvGrpSpPr/>
         <p:nvPr/>
       </p:nvGrpSpPr>
@@ -8357,7 +8893,7 @@
       </p:grpSpPr>
       <p:sp>
         <p:nvSpPr>
-          <p:cNvPr id="89" name="Google Shape;89;p17"/>
+          <p:cNvPr id="87" name="Google Shape;87;p17"/>
           <p:cNvSpPr txBox="1"/>
           <p:nvPr>
             <p:ph type="title"/>
@@ -8389,7 +8925,7 @@
             </a:pPr>
             <a:r>
               <a:rPr lang="en"/>
-              <a:t>Category/Category List</a:t>
+              <a:t>Database: To Do</a:t>
             </a:r>
             <a:endParaRPr/>
           </a:p>
@@ -8397,7 +8933,7 @@
       </p:sp>
       <p:sp>
         <p:nvSpPr>
-          <p:cNvPr id="90" name="Google Shape;90;p17"/>
+          <p:cNvPr id="88" name="Google Shape;88;p17"/>
           <p:cNvSpPr txBox="1"/>
           <p:nvPr>
             <p:ph idx="1" type="body"/>
@@ -8430,7 +8966,54 @@
             </a:pPr>
             <a:r>
               <a:rPr lang="en"/>
-              <a:t>Removal of “CategoryList” class</a:t>
+              <a:t>Create PHP script</a:t>
+            </a:r>
+            <a:endParaRPr/>
+          </a:p>
+          <a:p>
+            <a:pPr indent="0" lvl="0" marL="457200" rtl="0" algn="l">
+              <a:spcBef>
+                <a:spcPts val="1200"/>
+              </a:spcBef>
+              <a:spcAft>
+                <a:spcPts val="0"/>
+              </a:spcAft>
+              <a:buNone/>
+            </a:pPr>
+            <a:r>
+              <a:t/>
+            </a:r>
+            <a:endParaRPr/>
+          </a:p>
+          <a:p>
+            <a:pPr indent="-342900" lvl="0" marL="457200" rtl="0" algn="l">
+              <a:spcBef>
+                <a:spcPts val="1200"/>
+              </a:spcBef>
+              <a:spcAft>
+                <a:spcPts val="0"/>
+              </a:spcAft>
+              <a:buSzPts val="1800"/>
+              <a:buChar char="●"/>
+            </a:pPr>
+            <a:r>
+              <a:rPr lang="en"/>
+              <a:t>MySQL Synchronization event</a:t>
+            </a:r>
+            <a:endParaRPr/>
+          </a:p>
+          <a:p>
+            <a:pPr indent="0" lvl="0" marL="457200" rtl="0" algn="l">
+              <a:spcBef>
+                <a:spcPts val="1200"/>
+              </a:spcBef>
+              <a:spcAft>
+                <a:spcPts val="1200"/>
+              </a:spcAft>
+              <a:buNone/>
+            </a:pPr>
+            <a:r>
+              <a:t/>
             </a:r>
             <a:endParaRPr/>
           </a:p>
@@ -8438,7 +9021,7 @@
       </p:sp>
       <p:pic>
         <p:nvPicPr>
-          <p:cNvPr id="91" name="Google Shape;91;p17"/>
+          <p:cNvPr id="89" name="Google Shape;89;p17"/>
           <p:cNvPicPr preferRelativeResize="0"/>
           <p:nvPr/>
         </p:nvPicPr>
@@ -8452,8 +9035,8 @@
         </p:blipFill>
         <p:spPr>
           <a:xfrm>
-            <a:off x="5740700" y="1152463"/>
-            <a:ext cx="2085975" cy="1114425"/>
+            <a:off x="6152888" y="1152475"/>
+            <a:ext cx="1933575" cy="1638300"/>
           </a:xfrm>
           <a:prstGeom prst="rect">
             <a:avLst/>
@@ -8477,7 +9060,7 @@
   <p:cSld>
     <p:spTree>
       <p:nvGrpSpPr>
-        <p:cNvPr id="95" name="Shape 95"/>
+        <p:cNvPr id="93" name="Shape 93"/>
         <p:cNvGrpSpPr/>
         <p:nvPr/>
       </p:nvGrpSpPr>
@@ -8491,7 +9074,7 @@
       </p:grpSpPr>
       <p:sp>
         <p:nvSpPr>
-          <p:cNvPr id="96" name="Google Shape;96;p18"/>
+          <p:cNvPr id="94" name="Google Shape;94;p18"/>
           <p:cNvSpPr txBox="1"/>
           <p:nvPr>
             <p:ph type="title"/>
@@ -8523,7 +9106,7 @@
             </a:pPr>
             <a:r>
               <a:rPr lang="en"/>
-              <a:t>History</a:t>
+              <a:t>Main</a:t>
             </a:r>
             <a:endParaRPr/>
           </a:p>
@@ -8531,7 +9114,7 @@
       </p:sp>
       <p:sp>
         <p:nvSpPr>
-          <p:cNvPr id="97" name="Google Shape;97;p18"/>
+          <p:cNvPr id="95" name="Google Shape;95;p18"/>
           <p:cNvSpPr txBox="1"/>
           <p:nvPr>
             <p:ph idx="1" type="body"/>
@@ -8540,6 +9123,98 @@
         <p:spPr>
           <a:xfrm>
             <a:off x="311700" y="1152475"/>
+            <a:ext cx="3999900" cy="3416400"/>
+          </a:xfrm>
+          <a:prstGeom prst="rect">
+            <a:avLst/>
+          </a:prstGeom>
+        </p:spPr>
+        <p:txBody>
+          <a:bodyPr anchorCtr="0" anchor="t" bIns="91425" lIns="91425" spcFirstLastPara="1" rIns="91425" wrap="square" tIns="91425">
+            <a:normAutofit/>
+          </a:bodyPr>
+          <a:lstStyle/>
+          <a:p>
+            <a:pPr indent="-342900" lvl="0" marL="457200" rtl="0" algn="l">
+              <a:spcBef>
+                <a:spcPts val="0"/>
+              </a:spcBef>
+              <a:spcAft>
+                <a:spcPts val="0"/>
+              </a:spcAft>
+              <a:buSzPts val="1800"/>
+              <a:buChar char="●"/>
+            </a:pPr>
+            <a:r>
+              <a:rPr lang="en" sz="1800"/>
+              <a:t>Added fields for the settings button, database helper, and task list.</a:t>
+            </a:r>
+            <a:endParaRPr sz="1800"/>
+          </a:p>
+          <a:p>
+            <a:pPr indent="-342900" lvl="0" marL="457200" rtl="0" algn="l">
+              <a:spcBef>
+                <a:spcPts val="0"/>
+              </a:spcBef>
+              <a:spcAft>
+                <a:spcPts val="0"/>
+              </a:spcAft>
+              <a:buSzPts val="1800"/>
+              <a:buChar char="●"/>
+            </a:pPr>
+            <a:r>
+              <a:rPr lang="en" sz="1800"/>
+              <a:t>onCreateOptionsMenu to bring up the add a task box.</a:t>
+            </a:r>
+            <a:endParaRPr sz="1800"/>
+          </a:p>
+          <a:p>
+            <a:pPr indent="-342900" lvl="0" marL="457200" rtl="0" algn="l">
+              <a:spcBef>
+                <a:spcPts val="0"/>
+              </a:spcBef>
+              <a:spcAft>
+                <a:spcPts val="0"/>
+              </a:spcAft>
+              <a:buSzPts val="1800"/>
+              <a:buChar char="●"/>
+            </a:pPr>
+            <a:r>
+              <a:rPr lang="en" sz="1800"/>
+              <a:t>onOptionsItemSelected to respond to user interactions of “add” or “cancel”</a:t>
+            </a:r>
+            <a:endParaRPr sz="1800"/>
+          </a:p>
+          <a:p>
+            <a:pPr indent="-342900" lvl="0" marL="457200" rtl="0" algn="l">
+              <a:spcBef>
+                <a:spcPts val="0"/>
+              </a:spcBef>
+              <a:spcAft>
+                <a:spcPts val="0"/>
+              </a:spcAft>
+              <a:buSzPts val="1800"/>
+              <a:buChar char="●"/>
+            </a:pPr>
+            <a:r>
+              <a:rPr lang="en" sz="1800"/>
+              <a:t>onClick for the settings button</a:t>
+            </a:r>
+            <a:endParaRPr sz="1800"/>
+          </a:p>
+        </p:txBody>
+      </p:sp>
+      <p:sp>
+        <p:nvSpPr>
+          <p:cNvPr id="96" name="Google Shape;96;p18"/>
+          <p:cNvSpPr txBox="1"/>
+          <p:nvPr>
+            <p:ph idx="2" type="body"/>
+          </p:nvPr>
+        </p:nvSpPr>
+        <p:spPr>
+          <a:xfrm>
+            <a:off x="4832400" y="1152475"/>
             <a:ext cx="3999900" cy="3416400"/>
           </a:xfrm>
           <a:prstGeom prst="rect">
@@ -8557,92 +9232,45 @@
                 <a:spcPts val="0"/>
               </a:spcBef>
               <a:spcAft>
-                <a:spcPts val="0"/>
+                <a:spcPts val="1200"/>
               </a:spcAft>
               <a:buNone/>
             </a:pPr>
             <a:r>
-              <a:rPr lang="en" sz="1800"/>
-              <a:t>Completed:</a:t>
+              <a:t/>
             </a:r>
-            <a:endParaRPr sz="1800"/>
-          </a:p>
-          <a:p>
-            <a:pPr indent="-342900" lvl="0" marL="457200" rtl="0" algn="l">
-              <a:spcBef>
-                <a:spcPts val="1200"/>
-              </a:spcBef>
-              <a:spcAft>
-                <a:spcPts val="0"/>
-              </a:spcAft>
-              <a:buSzPts val="1800"/>
-              <a:buChar char="●"/>
-            </a:pPr>
-            <a:r>
-              <a:rPr lang="en" sz="1800"/>
-              <a:t>Create activity on main page to show list of completed tasks.</a:t>
-            </a:r>
-            <a:endParaRPr sz="1800"/>
+            <a:endParaRPr/>
           </a:p>
         </p:txBody>
       </p:sp>
-      <p:sp>
-        <p:nvSpPr>
-          <p:cNvPr id="98" name="Google Shape;98;p18"/>
-          <p:cNvSpPr txBox="1"/>
-          <p:nvPr>
-            <p:ph idx="2" type="body"/>
-          </p:nvPr>
-        </p:nvSpPr>
-        <p:spPr>
-          <a:xfrm>
-            <a:off x="4832400" y="1152475"/>
-            <a:ext cx="3999900" cy="3416400"/>
+      <p:pic>
+        <p:nvPicPr>
+          <p:cNvPr id="97" name="Google Shape;97;p18"/>
+          <p:cNvPicPr preferRelativeResize="0"/>
+          <p:nvPr/>
+        </p:nvPicPr>
+        <p:blipFill>
+          <a:blip r:embed="rId3">
+            <a:alphaModFix/>
+          </a:blip>
+          <a:stretch>
+            <a:fillRect/>
+          </a:stretch>
+        </p:blipFill>
+        <p:spPr>
+          <a:xfrm>
+            <a:off x="4631763" y="1184275"/>
+            <a:ext cx="4200525" cy="3352800"/>
           </a:xfrm>
           <a:prstGeom prst="rect">
             <a:avLst/>
           </a:prstGeom>
-        </p:spPr>
-        <p:txBody>
-          <a:bodyPr anchorCtr="0" anchor="t" bIns="91425" lIns="91425" spcFirstLastPara="1" rIns="91425" wrap="square" tIns="91425">
-            <a:normAutofit/>
-          </a:bodyPr>
-          <a:lstStyle/>
-          <a:p>
-            <a:pPr indent="0" lvl="0" marL="0" rtl="0" algn="l">
-              <a:spcBef>
-                <a:spcPts val="0"/>
-              </a:spcBef>
-              <a:spcAft>
-                <a:spcPts val="0"/>
-              </a:spcAft>
-              <a:buNone/>
-            </a:pPr>
-            <a:r>
-              <a:rPr lang="en" sz="1800"/>
-              <a:t>To do:</a:t>
-            </a:r>
-            <a:endParaRPr sz="1800"/>
-          </a:p>
-          <a:p>
-            <a:pPr indent="-342900" lvl="0" marL="457200" rtl="0" algn="l">
-              <a:spcBef>
-                <a:spcPts val="1200"/>
-              </a:spcBef>
-              <a:spcAft>
-                <a:spcPts val="0"/>
-              </a:spcAft>
-              <a:buSzPts val="1800"/>
-              <a:buChar char="●"/>
-            </a:pPr>
-            <a:r>
-              <a:rPr lang="en" sz="1800"/>
-              <a:t>Use an ArrayList filled with tasks set as complete to display history, similar to task list and category list.</a:t>
-            </a:r>
-            <a:endParaRPr sz="1800"/>
-          </a:p>
-        </p:txBody>
-      </p:sp>
+          <a:noFill/>
+          <a:ln>
+            <a:noFill/>
+          </a:ln>
+        </p:spPr>
+      </p:pic>
     </p:spTree>
   </p:cSld>
   <p:clrMapOvr>
@@ -8656,7 +9284,7 @@
   <p:cSld>
     <p:spTree>
       <p:nvGrpSpPr>
-        <p:cNvPr id="102" name="Shape 102"/>
+        <p:cNvPr id="101" name="Shape 101"/>
         <p:cNvGrpSpPr/>
         <p:nvPr/>
       </p:nvGrpSpPr>
@@ -8670,7 +9298,7 @@
       </p:grpSpPr>
       <p:sp>
         <p:nvSpPr>
-          <p:cNvPr id="103" name="Google Shape;103;p19"/>
+          <p:cNvPr id="102" name="Google Shape;102;p19"/>
           <p:cNvSpPr txBox="1"/>
           <p:nvPr>
             <p:ph type="title"/>
@@ -8702,9 +9330,84 @@
             </a:pPr>
             <a:r>
               <a:rPr lang="en"/>
-              <a:t>Calendar</a:t>
+              <a:t>Main: To do</a:t>
             </a:r>
             <a:endParaRPr/>
+          </a:p>
+        </p:txBody>
+      </p:sp>
+      <p:sp>
+        <p:nvSpPr>
+          <p:cNvPr id="103" name="Google Shape;103;p19"/>
+          <p:cNvSpPr txBox="1"/>
+          <p:nvPr>
+            <p:ph idx="1" type="body"/>
+          </p:nvPr>
+        </p:nvSpPr>
+        <p:spPr>
+          <a:xfrm>
+            <a:off x="311700" y="1152475"/>
+            <a:ext cx="3999900" cy="3416400"/>
+          </a:xfrm>
+          <a:prstGeom prst="rect">
+            <a:avLst/>
+          </a:prstGeom>
+        </p:spPr>
+        <p:txBody>
+          <a:bodyPr anchorCtr="0" anchor="t" bIns="91425" lIns="91425" spcFirstLastPara="1" rIns="91425" wrap="square" tIns="91425">
+            <a:normAutofit/>
+          </a:bodyPr>
+          <a:lstStyle/>
+          <a:p>
+            <a:pPr indent="-342900" lvl="0" marL="457200" rtl="0" algn="l">
+              <a:spcBef>
+                <a:spcPts val="0"/>
+              </a:spcBef>
+              <a:spcAft>
+                <a:spcPts val="0"/>
+              </a:spcAft>
+              <a:buSzPts val="1800"/>
+              <a:buChar char="●"/>
+            </a:pPr>
+            <a:r>
+              <a:rPr lang="en" sz="1800"/>
+              <a:t>Add the remaining fields when adding tasks.</a:t>
+            </a:r>
+            <a:endParaRPr sz="1800"/>
+          </a:p>
+          <a:p>
+            <a:pPr indent="-342900" lvl="0" marL="457200" rtl="0" algn="l">
+              <a:spcBef>
+                <a:spcPts val="0"/>
+              </a:spcBef>
+              <a:spcAft>
+                <a:spcPts val="0"/>
+              </a:spcAft>
+              <a:buSzPts val="1800"/>
+              <a:buChar char="●"/>
+            </a:pPr>
+            <a:r>
+              <a:rPr lang="en" sz="1800"/>
+              <a:t>Add a method to update UI after adding a task. </a:t>
+            </a:r>
+            <a:endParaRPr sz="1800"/>
+          </a:p>
+          <a:p>
+            <a:pPr indent="-342900" lvl="0" marL="457200" rtl="0" algn="l">
+              <a:spcBef>
+                <a:spcPts val="0"/>
+              </a:spcBef>
+              <a:spcAft>
+                <a:spcPts val="0"/>
+              </a:spcAft>
+              <a:buSzPts val="1800"/>
+              <a:buChar char="●"/>
+            </a:pPr>
+            <a:r>
+              <a:rPr lang="en" sz="1800"/>
+              <a:t>Change button for completion to an interaction when selecting a task.</a:t>
+            </a:r>
+            <a:endParaRPr sz="1800"/>
           </a:p>
         </p:txBody>
       </p:sp>
@@ -8713,13 +9416,13 @@
           <p:cNvPr id="104" name="Google Shape;104;p19"/>
           <p:cNvSpPr txBox="1"/>
           <p:nvPr>
-            <p:ph idx="1" type="body"/>
+            <p:ph idx="2" type="body"/>
           </p:nvPr>
         </p:nvSpPr>
         <p:spPr>
           <a:xfrm>
-            <a:off x="311700" y="1152475"/>
-            <a:ext cx="5394300" cy="3416400"/>
+            <a:off x="4832400" y="1152475"/>
+            <a:ext cx="3999900" cy="3416400"/>
           </a:xfrm>
           <a:prstGeom prst="rect">
             <a:avLst/>
@@ -8727,7 +9430,7 @@
         </p:spPr>
         <p:txBody>
           <a:bodyPr anchorCtr="0" anchor="t" bIns="91425" lIns="91425" spcFirstLastPara="1" rIns="91425" wrap="square" tIns="91425">
-            <a:normAutofit fontScale="77500" lnSpcReduction="20000"/>
+            <a:normAutofit/>
           </a:bodyPr>
           <a:lstStyle/>
           <a:p>
@@ -8736,124 +9439,12 @@
                 <a:spcPts val="0"/>
               </a:spcBef>
               <a:spcAft>
-                <a:spcPts val="0"/>
-              </a:spcAft>
-              <a:buNone/>
-            </a:pPr>
-            <a:r>
-              <a:rPr lang="en"/>
-              <a:t>Changes:</a:t>
-            </a:r>
-            <a:endParaRPr/>
-          </a:p>
-          <a:p>
-            <a:pPr indent="0" lvl="0" marL="0" rtl="0" algn="l">
-              <a:spcBef>
                 <a:spcPts val="1200"/>
-              </a:spcBef>
-              <a:spcAft>
-                <a:spcPts val="0"/>
-              </a:spcAft>
-              <a:buNone/>
-            </a:pPr>
-            <a:r>
-              <a:rPr lang="en"/>
-              <a:t>-When a date is selected, any tasks that fall under that day will be displayed in the area below the calendar.</a:t>
-            </a:r>
-            <a:endParaRPr/>
-          </a:p>
-          <a:p>
-            <a:pPr indent="0" lvl="0" marL="0" rtl="0" algn="l">
-              <a:spcBef>
-                <a:spcPts val="1200"/>
-              </a:spcBef>
-              <a:spcAft>
-                <a:spcPts val="0"/>
               </a:spcAft>
               <a:buNone/>
             </a:pPr>
             <a:r>
               <a:t/>
-            </a:r>
-            <a:endParaRPr/>
-          </a:p>
-          <a:p>
-            <a:pPr indent="0" lvl="0" marL="0" rtl="0" algn="l">
-              <a:spcBef>
-                <a:spcPts val="1200"/>
-              </a:spcBef>
-              <a:spcAft>
-                <a:spcPts val="0"/>
-              </a:spcAft>
-              <a:buNone/>
-            </a:pPr>
-            <a:r>
-              <a:rPr lang="en"/>
-              <a:t>To Do:</a:t>
-            </a:r>
-            <a:endParaRPr/>
-          </a:p>
-          <a:p>
-            <a:pPr indent="0" lvl="0" marL="0" rtl="0" algn="l">
-              <a:spcBef>
-                <a:spcPts val="1200"/>
-              </a:spcBef>
-              <a:spcAft>
-                <a:spcPts val="0"/>
-              </a:spcAft>
-              <a:buNone/>
-            </a:pPr>
-            <a:r>
-              <a:rPr lang="en"/>
-              <a:t>-Displaying the tasks under selected days.</a:t>
-            </a:r>
-            <a:endParaRPr/>
-          </a:p>
-          <a:p>
-            <a:pPr indent="0" lvl="0" marL="0" rtl="0" algn="l">
-              <a:spcBef>
-                <a:spcPts val="1200"/>
-              </a:spcBef>
-              <a:spcAft>
-                <a:spcPts val="0"/>
-              </a:spcAft>
-              <a:buNone/>
-            </a:pPr>
-            <a:r>
-              <a:rPr lang="en"/>
-              <a:t>-Adding an “Undated” button for tasks that were not given a specified date.</a:t>
-            </a:r>
-            <a:endParaRPr/>
-          </a:p>
-          <a:p>
-            <a:pPr indent="0" lvl="0" marL="0" rtl="0" algn="l">
-              <a:spcBef>
-                <a:spcPts val="1200"/>
-              </a:spcBef>
-              <a:spcAft>
-                <a:spcPts val="0"/>
-              </a:spcAft>
-              <a:buNone/>
-            </a:pPr>
-            <a:r>
-              <a:rPr lang="en"/>
-              <a:t>-Adding the category list drop down</a:t>
-            </a:r>
-            <a:endParaRPr/>
-          </a:p>
-          <a:p>
-            <a:pPr indent="0" lvl="0" marL="0" rtl="0" algn="l">
-              <a:spcBef>
-                <a:spcPts val="1200"/>
-              </a:spcBef>
-              <a:spcAft>
-                <a:spcPts val="1200"/>
-              </a:spcAft>
-              <a:buNone/>
-            </a:pPr>
-            <a:r>
-              <a:rPr lang="en"/>
-              <a:t>-Adding the yearly view functionality</a:t>
             </a:r>
             <a:endParaRPr/>
           </a:p>
@@ -8875,8 +9466,36 @@
         </p:blipFill>
         <p:spPr>
           <a:xfrm>
-            <a:off x="6192650" y="445025"/>
-            <a:ext cx="2639649" cy="4546074"/>
+            <a:off x="6850013" y="767324"/>
+            <a:ext cx="2073950" cy="3867601"/>
+          </a:xfrm>
+          <a:prstGeom prst="rect">
+            <a:avLst/>
+          </a:prstGeom>
+          <a:noFill/>
+          <a:ln>
+            <a:noFill/>
+          </a:ln>
+        </p:spPr>
+      </p:pic>
+      <p:pic>
+        <p:nvPicPr>
+          <p:cNvPr id="106" name="Google Shape;106;p19"/>
+          <p:cNvPicPr preferRelativeResize="0"/>
+          <p:nvPr/>
+        </p:nvPicPr>
+        <p:blipFill>
+          <a:blip r:embed="rId4">
+            <a:alphaModFix/>
+          </a:blip>
+          <a:stretch>
+            <a:fillRect/>
+          </a:stretch>
+        </p:blipFill>
+        <p:spPr>
+          <a:xfrm>
+            <a:off x="4580679" y="781026"/>
+            <a:ext cx="2000259" cy="3840199"/>
           </a:xfrm>
           <a:prstGeom prst="rect">
             <a:avLst/>
@@ -8900,7 +9519,7 @@
   <p:cSld>
     <p:spTree>
       <p:nvGrpSpPr>
-        <p:cNvPr id="109" name="Shape 109"/>
+        <p:cNvPr id="110" name="Shape 110"/>
         <p:cNvGrpSpPr/>
         <p:nvPr/>
       </p:nvGrpSpPr>
@@ -8914,7 +9533,7 @@
       </p:grpSpPr>
       <p:sp>
         <p:nvSpPr>
-          <p:cNvPr id="110" name="Google Shape;110;p20"/>
+          <p:cNvPr id="111" name="Google Shape;111;p20"/>
           <p:cNvSpPr txBox="1"/>
           <p:nvPr>
             <p:ph type="title"/>
@@ -8946,7 +9565,7 @@
             </a:pPr>
             <a:r>
               <a:rPr lang="en"/>
-              <a:t>Settings</a:t>
+              <a:t>History</a:t>
             </a:r>
             <a:endParaRPr/>
           </a:p>
@@ -8954,7 +9573,7 @@
       </p:sp>
       <p:sp>
         <p:nvSpPr>
-          <p:cNvPr id="111" name="Google Shape;111;p20"/>
+          <p:cNvPr id="112" name="Google Shape;112;p20"/>
           <p:cNvSpPr txBox="1"/>
           <p:nvPr>
             <p:ph idx="1" type="body"/>
@@ -8963,7 +9582,7 @@
         <p:spPr>
           <a:xfrm>
             <a:off x="311700" y="1152475"/>
-            <a:ext cx="3375300" cy="3416400"/>
+            <a:ext cx="3999900" cy="3416400"/>
           </a:xfrm>
           <a:prstGeom prst="rect">
             <a:avLst/>
@@ -8985,111 +9604,50 @@
               <a:buNone/>
             </a:pPr>
             <a:r>
-              <a:rPr lang="en"/>
-              <a:t>Changes:</a:t>
+              <a:rPr lang="en" sz="1800"/>
+              <a:t>Completed:</a:t>
             </a:r>
-            <a:endParaRPr/>
+            <a:endParaRPr sz="1800"/>
           </a:p>
           <a:p>
-            <a:pPr indent="0" lvl="0" marL="0" rtl="0" algn="l">
+            <a:pPr indent="-342900" lvl="0" marL="457200" rtl="0" algn="l">
               <a:spcBef>
                 <a:spcPts val="1200"/>
               </a:spcBef>
               <a:spcAft>
                 <a:spcPts val="0"/>
               </a:spcAft>
-              <a:buNone/>
+              <a:buSzPts val="1800"/>
+              <a:buChar char="●"/>
             </a:pPr>
             <a:r>
-              <a:rPr lang="en"/>
-              <a:t>-Some function parameters and return values have changed</a:t>
+              <a:rPr lang="en" sz="1800"/>
+              <a:t>Create activity on main page to show list of completed tasks.</a:t>
             </a:r>
-            <a:endParaRPr/>
-          </a:p>
-          <a:p>
-            <a:pPr indent="0" lvl="0" marL="0" rtl="0" algn="l">
-              <a:spcBef>
-                <a:spcPts val="1200"/>
-              </a:spcBef>
-              <a:spcAft>
-                <a:spcPts val="0"/>
-              </a:spcAft>
-              <a:buNone/>
-            </a:pPr>
-            <a:r>
-              <a:rPr lang="en"/>
-              <a:t>-notificationType has been split into notificationEmail and notificationPush</a:t>
-            </a:r>
-            <a:endParaRPr/>
-          </a:p>
-          <a:p>
-            <a:pPr indent="0" lvl="0" marL="0" rtl="0" algn="l">
-              <a:spcBef>
-                <a:spcPts val="1200"/>
-              </a:spcBef>
-              <a:spcAft>
-                <a:spcPts val="1200"/>
-              </a:spcAft>
-              <a:buNone/>
-            </a:pPr>
-            <a:r>
-              <a:rPr lang="en"/>
-              <a:t>-INPUT_DB_HOST was added for the database</a:t>
-            </a:r>
-            <a:endParaRPr/>
+            <a:endParaRPr sz="1800"/>
           </a:p>
         </p:txBody>
       </p:sp>
-      <p:pic>
-        <p:nvPicPr>
-          <p:cNvPr id="112" name="Google Shape;112;p20"/>
-          <p:cNvPicPr preferRelativeResize="0"/>
-          <p:nvPr/>
-        </p:nvPicPr>
-        <p:blipFill>
-          <a:blip r:embed="rId3">
-            <a:alphaModFix/>
-          </a:blip>
-          <a:stretch>
-            <a:fillRect/>
-          </a:stretch>
-        </p:blipFill>
-        <p:spPr>
-          <a:xfrm>
-            <a:off x="5476875" y="697676"/>
-            <a:ext cx="2851175" cy="3321925"/>
-          </a:xfrm>
-          <a:prstGeom prst="rect">
-            <a:avLst/>
-          </a:prstGeom>
-          <a:noFill/>
-          <a:ln>
-            <a:noFill/>
-          </a:ln>
-        </p:spPr>
-      </p:pic>
       <p:sp>
         <p:nvSpPr>
           <p:cNvPr id="113" name="Google Shape;113;p20"/>
           <p:cNvSpPr txBox="1"/>
-          <p:nvPr/>
+          <p:nvPr>
+            <p:ph idx="2" type="body"/>
+          </p:nvPr>
         </p:nvSpPr>
         <p:spPr>
           <a:xfrm>
-            <a:off x="4410150" y="3244825"/>
-            <a:ext cx="5786400" cy="400200"/>
+            <a:off x="4832400" y="1152475"/>
+            <a:ext cx="3999900" cy="3416400"/>
           </a:xfrm>
           <a:prstGeom prst="rect">
             <a:avLst/>
           </a:prstGeom>
-          <a:noFill/>
-          <a:ln>
-            <a:noFill/>
-          </a:ln>
         </p:spPr>
         <p:txBody>
           <a:bodyPr anchorCtr="0" anchor="t" bIns="91425" lIns="91425" spcFirstLastPara="1" rIns="91425" wrap="square" tIns="91425">
-            <a:spAutoFit/>
+            <a:normAutofit/>
           </a:bodyPr>
           <a:lstStyle/>
           <a:p>
@@ -9103,14 +9661,27 @@
               <a:buNone/>
             </a:pPr>
             <a:r>
-              <a:t/>
+              <a:rPr lang="en" sz="1800"/>
+              <a:t>To do:</a:t>
             </a:r>
-            <a:endParaRPr>
-              <a:latin typeface="Average"/>
-              <a:ea typeface="Average"/>
-              <a:cs typeface="Average"/>
-              <a:sym typeface="Average"/>
-            </a:endParaRPr>
+            <a:endParaRPr sz="1800"/>
+          </a:p>
+          <a:p>
+            <a:pPr indent="-342900" lvl="0" marL="457200" rtl="0" algn="l">
+              <a:spcBef>
+                <a:spcPts val="1200"/>
+              </a:spcBef>
+              <a:spcAft>
+                <a:spcPts val="0"/>
+              </a:spcAft>
+              <a:buSzPts val="1800"/>
+              <a:buChar char="●"/>
+            </a:pPr>
+            <a:r>
+              <a:rPr lang="en" sz="1800"/>
+              <a:t>Use an ArrayList filled with tasks set as complete to display history, similar to task list and category list.</a:t>
+            </a:r>
+            <a:endParaRPr sz="1800"/>
           </a:p>
         </p:txBody>
       </p:sp>
@@ -9173,7 +9744,7 @@
             </a:pPr>
             <a:r>
               <a:rPr lang="en"/>
-              <a:t>Settings</a:t>
+              <a:t>Calendar</a:t>
             </a:r>
             <a:endParaRPr/>
           </a:p>
@@ -9183,31 +9754,26 @@
         <p:nvSpPr>
           <p:cNvPr id="119" name="Google Shape;119;p21"/>
           <p:cNvSpPr txBox="1"/>
-          <p:nvPr/>
+          <p:nvPr>
+            <p:ph idx="1" type="body"/>
+          </p:nvPr>
         </p:nvSpPr>
         <p:spPr>
           <a:xfrm>
-            <a:off x="803675" y="1913575"/>
-            <a:ext cx="2431200" cy="1982400"/>
+            <a:off x="311700" y="1152475"/>
+            <a:ext cx="5394300" cy="3416400"/>
           </a:xfrm>
           <a:prstGeom prst="rect">
             <a:avLst/>
           </a:prstGeom>
-          <a:noFill/>
-          <a:ln>
-            <a:noFill/>
-          </a:ln>
         </p:spPr>
         <p:txBody>
           <a:bodyPr anchorCtr="0" anchor="t" bIns="91425" lIns="91425" spcFirstLastPara="1" rIns="91425" wrap="square" tIns="91425">
-            <a:spAutoFit/>
+            <a:normAutofit fontScale="77500" lnSpcReduction="20000"/>
           </a:bodyPr>
           <a:lstStyle/>
           <a:p>
             <a:pPr indent="0" lvl="0" marL="0" rtl="0" algn="l">
-              <a:lnSpc>
-                <a:spcPct val="115000"/>
-              </a:lnSpc>
               <a:spcBef>
                 <a:spcPts val="0"/>
               </a:spcBef>
@@ -9217,32 +9783,13 @@
               <a:buNone/>
             </a:pPr>
             <a:r>
-              <a:rPr lang="en" sz="1800">
-                <a:solidFill>
-                  <a:schemeClr val="accent3"/>
-                </a:solidFill>
-                <a:latin typeface="Average"/>
-                <a:ea typeface="Average"/>
-                <a:cs typeface="Average"/>
-                <a:sym typeface="Average"/>
-              </a:rPr>
-              <a:t>To Do:</a:t>
+              <a:rPr lang="en"/>
+              <a:t>Changes:</a:t>
             </a:r>
-            <a:endParaRPr sz="1800">
-              <a:solidFill>
-                <a:schemeClr val="accent3"/>
-              </a:solidFill>
-              <a:latin typeface="Average"/>
-              <a:ea typeface="Average"/>
-              <a:cs typeface="Average"/>
-              <a:sym typeface="Average"/>
-            </a:endParaRPr>
+            <a:endParaRPr/>
           </a:p>
           <a:p>
             <a:pPr indent="0" lvl="0" marL="0" rtl="0" algn="l">
-              <a:lnSpc>
-                <a:spcPct val="115000"/>
-              </a:lnSpc>
               <a:spcBef>
                 <a:spcPts val="1200"/>
               </a:spcBef>
@@ -9252,26 +9799,10 @@
               <a:buNone/>
             </a:pPr>
             <a:r>
-              <a:rPr lang="en" sz="1800">
-                <a:solidFill>
-                  <a:schemeClr val="accent3"/>
-                </a:solidFill>
-                <a:latin typeface="Average"/>
-                <a:ea typeface="Average"/>
-                <a:cs typeface="Average"/>
-                <a:sym typeface="Average"/>
-              </a:rPr>
-              <a:t>-help, switchScreen, and googleSignIn are not yet implemented.</a:t>
+              <a:rPr lang="en"/>
+              <a:t>-When a date is selected, any tasks that fall under that day will be displayed in the area below the calendar.</a:t>
             </a:r>
-            <a:endParaRPr sz="1800">
-              <a:solidFill>
-                <a:schemeClr val="accent3"/>
-              </a:solidFill>
-              <a:latin typeface="Average"/>
-              <a:ea typeface="Average"/>
-              <a:cs typeface="Average"/>
-              <a:sym typeface="Average"/>
-            </a:endParaRPr>
+            <a:endParaRPr/>
           </a:p>
           <a:p>
             <a:pPr indent="0" lvl="0" marL="0" rtl="0" algn="l">
@@ -9286,12 +9817,87 @@
             <a:r>
               <a:t/>
             </a:r>
-            <a:endParaRPr>
-              <a:latin typeface="Average"/>
-              <a:ea typeface="Average"/>
-              <a:cs typeface="Average"/>
-              <a:sym typeface="Average"/>
-            </a:endParaRPr>
+            <a:endParaRPr/>
+          </a:p>
+          <a:p>
+            <a:pPr indent="0" lvl="0" marL="0" rtl="0" algn="l">
+              <a:spcBef>
+                <a:spcPts val="1200"/>
+              </a:spcBef>
+              <a:spcAft>
+                <a:spcPts val="0"/>
+              </a:spcAft>
+              <a:buNone/>
+            </a:pPr>
+            <a:r>
+              <a:rPr lang="en"/>
+              <a:t>To Do:</a:t>
+            </a:r>
+            <a:endParaRPr/>
+          </a:p>
+          <a:p>
+            <a:pPr indent="0" lvl="0" marL="0" rtl="0" algn="l">
+              <a:spcBef>
+                <a:spcPts val="1200"/>
+              </a:spcBef>
+              <a:spcAft>
+                <a:spcPts val="0"/>
+              </a:spcAft>
+              <a:buNone/>
+            </a:pPr>
+            <a:r>
+              <a:rPr lang="en"/>
+              <a:t>-Displaying the tasks under selected days.</a:t>
+            </a:r>
+            <a:endParaRPr/>
+          </a:p>
+          <a:p>
+            <a:pPr indent="0" lvl="0" marL="0" rtl="0" algn="l">
+              <a:spcBef>
+                <a:spcPts val="1200"/>
+              </a:spcBef>
+              <a:spcAft>
+                <a:spcPts val="0"/>
+              </a:spcAft>
+              <a:buNone/>
+            </a:pPr>
+            <a:r>
+              <a:rPr lang="en"/>
+              <a:t>-Adding an “Undated” button for tasks that were not given a specified date.</a:t>
+            </a:r>
+            <a:endParaRPr/>
+          </a:p>
+          <a:p>
+            <a:pPr indent="0" lvl="0" marL="0" rtl="0" algn="l">
+              <a:spcBef>
+                <a:spcPts val="1200"/>
+              </a:spcBef>
+              <a:spcAft>
+                <a:spcPts val="0"/>
+              </a:spcAft>
+              <a:buNone/>
+            </a:pPr>
+            <a:r>
+              <a:rPr lang="en"/>
+              <a:t>-Adding the category list drop down</a:t>
+            </a:r>
+            <a:endParaRPr/>
+          </a:p>
+          <a:p>
+            <a:pPr indent="0" lvl="0" marL="0" rtl="0" algn="l">
+              <a:spcBef>
+                <a:spcPts val="1200"/>
+              </a:spcBef>
+              <a:spcAft>
+                <a:spcPts val="1200"/>
+              </a:spcAft>
+              <a:buNone/>
+            </a:pPr>
+            <a:r>
+              <a:rPr lang="en"/>
+              <a:t>-Adding the yearly view functionality</a:t>
+            </a:r>
+            <a:endParaRPr/>
           </a:p>
         </p:txBody>
       </p:sp>
@@ -9311,8 +9917,8 @@
         </p:blipFill>
         <p:spPr>
           <a:xfrm>
-            <a:off x="5283951" y="356625"/>
-            <a:ext cx="2494225" cy="4430250"/>
+            <a:off x="6192650" y="445025"/>
+            <a:ext cx="2639649" cy="4546074"/>
           </a:xfrm>
           <a:prstGeom prst="rect">
             <a:avLst/>
@@ -9332,6 +9938,285 @@
 </file>
 
 <file path=ppt/theme/theme1.xml><?xml version="1.0" encoding="utf-8"?>
+<a:theme xmlns:a="http://schemas.openxmlformats.org/drawingml/2006/main" xmlns:r="http://schemas.openxmlformats.org/officeDocument/2006/relationships">
+  <a:themeElements>
+    <a:clrScheme name="Default">
+      <a:dk1>
+        <a:srgbClr val="000000"/>
+      </a:dk1>
+      <a:lt1>
+        <a:srgbClr val="FFFFFF"/>
+      </a:lt1>
+      <a:dk2>
+        <a:srgbClr val="158158"/>
+      </a:dk2>
+      <a:lt2>
+        <a:srgbClr val="F3F3F3"/>
+      </a:lt2>
+      <a:accent1>
+        <a:srgbClr val="058DC7"/>
+      </a:accent1>
+      <a:accent2>
+        <a:srgbClr val="50B432"/>
+      </a:accent2>
+      <a:accent3>
+        <a:srgbClr val="ED561B"/>
+      </a:accent3>
+      <a:accent4>
+        <a:srgbClr val="EDEF00"/>
+      </a:accent4>
+      <a:accent5>
+        <a:srgbClr val="24CBE5"/>
+      </a:accent5>
+      <a:accent6>
+        <a:srgbClr val="64E572"/>
+      </a:accent6>
+      <a:hlink>
+        <a:srgbClr val="2200CC"/>
+      </a:hlink>
+      <a:folHlink>
+        <a:srgbClr val="551A8B"/>
+      </a:folHlink>
+    </a:clrScheme>
+    <a:fontScheme name="Office">
+      <a:majorFont>
+        <a:latin typeface="Arial"/>
+        <a:ea typeface=""/>
+        <a:cs typeface=""/>
+        <a:font script="Jpan" typeface="ＭＳ Ｐゴシック"/>
+        <a:font script="Hang" typeface="맑은 고딕"/>
+        <a:font script="Hans" typeface="宋体"/>
+        <a:font script="Hant" typeface="新細明體"/>
+        <a:font script="Arab" typeface="Times New Roman"/>
+        <a:font script="Hebr" typeface="Times New Roman"/>
+        <a:font script="Thai" typeface="Angsana New"/>
+        <a:font script="Ethi" typeface="Nyala"/>
+        <a:font script="Beng" typeface="Vrinda"/>
+        <a:font script="Gujr" typeface="Shruti"/>
+        <a:font script="Khmr" typeface="MoolBoran"/>
+        <a:font script="Knda" typeface="Tunga"/>
+        <a:font script="Guru" typeface="Raavi"/>
+        <a:font script="Cans" typeface="Euphemia"/>
+        <a:font script="Cher" typeface="Plantagenet Cherokee"/>
+        <a:font script="Yiii" typeface="Microsoft Yi Baiti"/>
+        <a:font script="Tibt" typeface="Microsoft Himalaya"/>
+        <a:font script="Thaa" typeface="MV Boli"/>
+        <a:font script="Deva" typeface="Mangal"/>
+        <a:font script="Telu" typeface="Gautami"/>
+        <a:font script="Taml" typeface="Latha"/>
+        <a:font script="Syrc" typeface="Estrangelo Edessa"/>
+        <a:font script="Orya" typeface="Kalinga"/>
+        <a:font script="Mlym" typeface="Kartika"/>
+        <a:font script="Laoo" typeface="DokChampa"/>
+        <a:font script="Sinh" typeface="Iskoola Pota"/>
+        <a:font script="Mong" typeface="Mongolian Baiti"/>
+        <a:font script="Viet" typeface="Times New Roman"/>
+        <a:font script="Uigh" typeface="Microsoft Uighur"/>
+        <a:font script="Geor" typeface="Sylfaen"/>
+      </a:majorFont>
+      <a:minorFont>
+        <a:latin typeface="Arial"/>
+        <a:ea typeface=""/>
+        <a:cs typeface=""/>
+        <a:font script="Jpan" typeface="ＭＳ Ｐゴシック"/>
+        <a:font script="Hang" typeface="맑은 고딕"/>
+        <a:font script="Hans" typeface="宋体"/>
+        <a:font script="Hant" typeface="新細明體"/>
+        <a:font script="Arab" typeface="Arial"/>
+        <a:font script="Hebr" typeface="Arial"/>
+        <a:font script="Thai" typeface="Cordia New"/>
+        <a:font script="Ethi" typeface="Nyala"/>
+        <a:font script="Beng" typeface="Vrinda"/>
+        <a:font script="Gujr" typeface="Shruti"/>
+        <a:font script="Khmr" typeface="DaunPenh"/>
+        <a:font script="Knda" typeface="Tunga"/>
+        <a:font script="Guru" typeface="Raavi"/>
+        <a:font script="Cans" typeface="Euphemia"/>
+        <a:font script="Cher" typeface="Plantagenet Cherokee"/>
+        <a:font script="Yiii" typeface="Microsoft Yi Baiti"/>
+        <a:font script="Tibt" typeface="Microsoft Himalaya"/>
+        <a:font script="Thaa" typeface="MV Boli"/>
+        <a:font script="Deva" typeface="Mangal"/>
+        <a:font script="Telu" typeface="Gautami"/>
+        <a:font script="Taml" typeface="Latha"/>
+        <a:font script="Syrc" typeface="Estrangelo Edessa"/>
+        <a:font script="Orya" typeface="Kalinga"/>
+        <a:font script="Mlym" typeface="Kartika"/>
+        <a:font script="Laoo" typeface="DokChampa"/>
+        <a:font script="Sinh" typeface="Iskoola Pota"/>
+        <a:font script="Mong" typeface="Mongolian Baiti"/>
+        <a:font script="Viet" typeface="Arial"/>
+        <a:font script="Uigh" typeface="Microsoft Uighur"/>
+        <a:font script="Geor" typeface="Sylfaen"/>
+      </a:minorFont>
+    </a:fontScheme>
+    <a:fmtScheme name="Office">
+      <a:fillStyleLst>
+        <a:solidFill>
+          <a:schemeClr val="phClr"/>
+        </a:solidFill>
+        <a:gradFill rotWithShape="1">
+          <a:gsLst>
+            <a:gs pos="0">
+              <a:schemeClr val="phClr">
+                <a:tint val="50000"/>
+                <a:satMod val="300000"/>
+              </a:schemeClr>
+            </a:gs>
+            <a:gs pos="35000">
+              <a:schemeClr val="phClr">
+                <a:tint val="37000"/>
+                <a:satMod val="300000"/>
+              </a:schemeClr>
+            </a:gs>
+            <a:gs pos="100000">
+              <a:schemeClr val="phClr">
+                <a:tint val="15000"/>
+                <a:satMod val="350000"/>
+              </a:schemeClr>
+            </a:gs>
+          </a:gsLst>
+          <a:lin ang="16200000" scaled="1"/>
+        </a:gradFill>
+        <a:gradFill rotWithShape="1">
+          <a:gsLst>
+            <a:gs pos="0">
+              <a:schemeClr val="phClr">
+                <a:tint val="100000"/>
+                <a:shade val="100000"/>
+                <a:satMod val="130000"/>
+              </a:schemeClr>
+            </a:gs>
+            <a:gs pos="100000">
+              <a:schemeClr val="phClr">
+                <a:tint val="50000"/>
+                <a:shade val="100000"/>
+                <a:satMod val="350000"/>
+              </a:schemeClr>
+            </a:gs>
+          </a:gsLst>
+          <a:lin ang="16200000" scaled="0"/>
+        </a:gradFill>
+      </a:fillStyleLst>
+      <a:lnStyleLst>
+        <a:ln w="9525" cap="flat" cmpd="sng" algn="ctr">
+          <a:solidFill>
+            <a:schemeClr val="phClr">
+              <a:shade val="95000"/>
+              <a:satMod val="105000"/>
+            </a:schemeClr>
+          </a:solidFill>
+          <a:prstDash val="solid"/>
+        </a:ln>
+        <a:ln w="25400" cap="flat" cmpd="sng" algn="ctr">
+          <a:solidFill>
+            <a:schemeClr val="phClr"/>
+          </a:solidFill>
+          <a:prstDash val="solid"/>
+        </a:ln>
+        <a:ln w="38100" cap="flat" cmpd="sng" algn="ctr">
+          <a:solidFill>
+            <a:schemeClr val="phClr"/>
+          </a:solidFill>
+          <a:prstDash val="solid"/>
+        </a:ln>
+      </a:lnStyleLst>
+      <a:effectStyleLst>
+        <a:effectStyle>
+          <a:effectLst>
+            <a:outerShdw blurRad="40000" dist="20000" dir="5400000" rotWithShape="0">
+              <a:srgbClr val="000000">
+                <a:alpha val="38000"/>
+              </a:srgbClr>
+            </a:outerShdw>
+          </a:effectLst>
+        </a:effectStyle>
+        <a:effectStyle>
+          <a:effectLst>
+            <a:outerShdw blurRad="40000" dist="23000" dir="5400000" rotWithShape="0">
+              <a:srgbClr val="000000">
+                <a:alpha val="35000"/>
+              </a:srgbClr>
+            </a:outerShdw>
+          </a:effectLst>
+        </a:effectStyle>
+        <a:effectStyle>
+          <a:effectLst>
+            <a:outerShdw blurRad="40000" dist="23000" dir="5400000" rotWithShape="0">
+              <a:srgbClr val="000000">
+                <a:alpha val="35000"/>
+              </a:srgbClr>
+            </a:outerShdw>
+          </a:effectLst>
+          <a:scene3d>
+            <a:camera prst="orthographicFront">
+              <a:rot lat="0" lon="0" rev="0"/>
+            </a:camera>
+            <a:lightRig rig="threePt" dir="t">
+              <a:rot lat="0" lon="0" rev="1200000"/>
+            </a:lightRig>
+          </a:scene3d>
+          <a:sp3d>
+            <a:bevelT w="63500" h="25400"/>
+          </a:sp3d>
+        </a:effectStyle>
+      </a:effectStyleLst>
+      <a:bgFillStyleLst>
+        <a:solidFill>
+          <a:schemeClr val="phClr"/>
+        </a:solidFill>
+        <a:gradFill rotWithShape="1">
+          <a:gsLst>
+            <a:gs pos="0">
+              <a:schemeClr val="phClr">
+                <a:tint val="40000"/>
+                <a:satMod val="350000"/>
+              </a:schemeClr>
+            </a:gs>
+            <a:gs pos="40000">
+              <a:schemeClr val="phClr">
+                <a:tint val="45000"/>
+                <a:shade val="99000"/>
+                <a:satMod val="350000"/>
+              </a:schemeClr>
+            </a:gs>
+            <a:gs pos="100000">
+              <a:schemeClr val="phClr">
+                <a:shade val="20000"/>
+                <a:satMod val="255000"/>
+              </a:schemeClr>
+            </a:gs>
+          </a:gsLst>
+          <a:path path="circle">
+            <a:fillToRect l="50000" t="-80000" r="50000" b="180000"/>
+          </a:path>
+        </a:gradFill>
+        <a:gradFill rotWithShape="1">
+          <a:gsLst>
+            <a:gs pos="0">
+              <a:schemeClr val="phClr">
+                <a:tint val="80000"/>
+                <a:satMod val="300000"/>
+              </a:schemeClr>
+            </a:gs>
+            <a:gs pos="100000">
+              <a:schemeClr val="phClr">
+                <a:shade val="30000"/>
+                <a:satMod val="200000"/>
+              </a:schemeClr>
+            </a:gs>
+          </a:gsLst>
+          <a:path path="circle">
+            <a:fillToRect l="50000" t="50000" r="50000" b="50000"/>
+          </a:path>
+        </a:gradFill>
+      </a:bgFillStyleLst>
+    </a:fmtScheme>
+  </a:themeElements>
+</a:theme>
+</file>
+
+<file path=ppt/theme/theme2.xml><?xml version="1.0" encoding="utf-8"?>
 <a:theme xmlns:a="http://schemas.openxmlformats.org/drawingml/2006/main" xmlns:r="http://schemas.openxmlformats.org/officeDocument/2006/relationships" name="Slate">
   <a:themeElements>
     <a:clrScheme name="Slate">
@@ -9608,283 +10493,4 @@
     </a:fmtScheme>
   </a:themeElements>
 </a:theme>
-</file>
-
-<file path=ppt/theme/theme2.xml><?xml version="1.0" encoding="utf-8"?>
-<a:theme xmlns:a="http://schemas.openxmlformats.org/drawingml/2006/main" xmlns:r="http://schemas.openxmlformats.org/officeDocument/2006/relationships">
-  <a:themeElements>
-    <a:clrScheme name="Default">
-      <a:dk1>
-        <a:srgbClr val="000000"/>
-      </a:dk1>
-      <a:lt1>
-        <a:srgbClr val="FFFFFF"/>
-      </a:lt1>
-      <a:dk2>
-        <a:srgbClr val="158158"/>
-      </a:dk2>
-      <a:lt2>
-        <a:srgbClr val="F3F3F3"/>
-      </a:lt2>
-      <a:accent1>
-        <a:srgbClr val="058DC7"/>
-      </a:accent1>
-      <a:accent2>
-        <a:srgbClr val="50B432"/>
-      </a:accent2>
-      <a:accent3>
-        <a:srgbClr val="ED561B"/>
-      </a:accent3>
-      <a:accent4>
-        <a:srgbClr val="EDEF00"/>
-      </a:accent4>
-      <a:accent5>
-        <a:srgbClr val="24CBE5"/>
-      </a:accent5>
-      <a:accent6>
-        <a:srgbClr val="64E572"/>
-      </a:accent6>
-      <a:hlink>
-        <a:srgbClr val="2200CC"/>
-      </a:hlink>
-      <a:folHlink>
-        <a:srgbClr val="551A8B"/>
-      </a:folHlink>
-    </a:clrScheme>
-    <a:fontScheme name="Office">
-      <a:majorFont>
-        <a:latin typeface="Arial"/>
-        <a:ea typeface=""/>
-        <a:cs typeface=""/>
-        <a:font script="Jpan" typeface="ＭＳ Ｐゴシック"/>
-        <a:font script="Hang" typeface="맑은 고딕"/>
-        <a:font script="Hans" typeface="宋体"/>
-        <a:font script="Hant" typeface="新細明體"/>
-        <a:font script="Arab" typeface="Times New Roman"/>
-        <a:font script="Hebr" typeface="Times New Roman"/>
-        <a:font script="Thai" typeface="Angsana New"/>
-        <a:font script="Ethi" typeface="Nyala"/>
-        <a:font script="Beng" typeface="Vrinda"/>
-        <a:font script="Gujr" typeface="Shruti"/>
-        <a:font script="Khmr" typeface="MoolBoran"/>
-        <a:font script="Knda" typeface="Tunga"/>
-        <a:font script="Guru" typeface="Raavi"/>
-        <a:font script="Cans" typeface="Euphemia"/>
-        <a:font script="Cher" typeface="Plantagenet Cherokee"/>
-        <a:font script="Yiii" typeface="Microsoft Yi Baiti"/>
-        <a:font script="Tibt" typeface="Microsoft Himalaya"/>
-        <a:font script="Thaa" typeface="MV Boli"/>
-        <a:font script="Deva" typeface="Mangal"/>
-        <a:font script="Telu" typeface="Gautami"/>
-        <a:font script="Taml" typeface="Latha"/>
-        <a:font script="Syrc" typeface="Estrangelo Edessa"/>
-        <a:font script="Orya" typeface="Kalinga"/>
-        <a:font script="Mlym" typeface="Kartika"/>
-        <a:font script="Laoo" typeface="DokChampa"/>
-        <a:font script="Sinh" typeface="Iskoola Pota"/>
-        <a:font script="Mong" typeface="Mongolian Baiti"/>
-        <a:font script="Viet" typeface="Times New Roman"/>
-        <a:font script="Uigh" typeface="Microsoft Uighur"/>
-        <a:font script="Geor" typeface="Sylfaen"/>
-      </a:majorFont>
-      <a:minorFont>
-        <a:latin typeface="Arial"/>
-        <a:ea typeface=""/>
-        <a:cs typeface=""/>
-        <a:font script="Jpan" typeface="ＭＳ Ｐゴシック"/>
-        <a:font script="Hang" typeface="맑은 고딕"/>
-        <a:font script="Hans" typeface="宋体"/>
-        <a:font script="Hant" typeface="新細明體"/>
-        <a:font script="Arab" typeface="Arial"/>
-        <a:font script="Hebr" typeface="Arial"/>
-        <a:font script="Thai" typeface="Cordia New"/>
-        <a:font script="Ethi" typeface="Nyala"/>
-        <a:font script="Beng" typeface="Vrinda"/>
-        <a:font script="Gujr" typeface="Shruti"/>
-        <a:font script="Khmr" typeface="DaunPenh"/>
-        <a:font script="Knda" typeface="Tunga"/>
-        <a:font script="Guru" typeface="Raavi"/>
-        <a:font script="Cans" typeface="Euphemia"/>
-        <a:font script="Cher" typeface="Plantagenet Cherokee"/>
-        <a:font script="Yiii" typeface="Microsoft Yi Baiti"/>
-        <a:font script="Tibt" typeface="Microsoft Himalaya"/>
-        <a:font script="Thaa" typeface="MV Boli"/>
-        <a:font script="Deva" typeface="Mangal"/>
-        <a:font script="Telu" typeface="Gautami"/>
-        <a:font script="Taml" typeface="Latha"/>
-        <a:font script="Syrc" typeface="Estrangelo Edessa"/>
-        <a:font script="Orya" typeface="Kalinga"/>
-        <a:font script="Mlym" typeface="Kartika"/>
-        <a:font script="Laoo" typeface="DokChampa"/>
-        <a:font script="Sinh" typeface="Iskoola Pota"/>
-        <a:font script="Mong" typeface="Mongolian Baiti"/>
-        <a:font script="Viet" typeface="Arial"/>
-        <a:font script="Uigh" typeface="Microsoft Uighur"/>
-        <a:font script="Geor" typeface="Sylfaen"/>
-      </a:minorFont>
-    </a:fontScheme>
-    <a:fmtScheme name="Office">
-      <a:fillStyleLst>
-        <a:solidFill>
-          <a:schemeClr val="phClr"/>
-        </a:solidFill>
-        <a:gradFill rotWithShape="1">
-          <a:gsLst>
-            <a:gs pos="0">
-              <a:schemeClr val="phClr">
-                <a:tint val="50000"/>
-                <a:satMod val="300000"/>
-              </a:schemeClr>
-            </a:gs>
-            <a:gs pos="35000">
-              <a:schemeClr val="phClr">
-                <a:tint val="37000"/>
-                <a:satMod val="300000"/>
-              </a:schemeClr>
-            </a:gs>
-            <a:gs pos="100000">
-              <a:schemeClr val="phClr">
-                <a:tint val="15000"/>
-                <a:satMod val="350000"/>
-              </a:schemeClr>
-            </a:gs>
-          </a:gsLst>
-          <a:lin ang="16200000" scaled="1"/>
-        </a:gradFill>
-        <a:gradFill rotWithShape="1">
-          <a:gsLst>
-            <a:gs pos="0">
-              <a:schemeClr val="phClr">
-                <a:tint val="100000"/>
-                <a:shade val="100000"/>
-                <a:satMod val="130000"/>
-              </a:schemeClr>
-            </a:gs>
-            <a:gs pos="100000">
-              <a:schemeClr val="phClr">
-                <a:tint val="50000"/>
-                <a:shade val="100000"/>
-                <a:satMod val="350000"/>
-              </a:schemeClr>
-            </a:gs>
-          </a:gsLst>
-          <a:lin ang="16200000" scaled="0"/>
-        </a:gradFill>
-      </a:fillStyleLst>
-      <a:lnStyleLst>
-        <a:ln w="9525" cap="flat" cmpd="sng" algn="ctr">
-          <a:solidFill>
-            <a:schemeClr val="phClr">
-              <a:shade val="95000"/>
-              <a:satMod val="105000"/>
-            </a:schemeClr>
-          </a:solidFill>
-          <a:prstDash val="solid"/>
-        </a:ln>
-        <a:ln w="25400" cap="flat" cmpd="sng" algn="ctr">
-          <a:solidFill>
-            <a:schemeClr val="phClr"/>
-          </a:solidFill>
-          <a:prstDash val="solid"/>
-        </a:ln>
-        <a:ln w="38100" cap="flat" cmpd="sng" algn="ctr">
-          <a:solidFill>
-            <a:schemeClr val="phClr"/>
-          </a:solidFill>
-          <a:prstDash val="solid"/>
-        </a:ln>
-      </a:lnStyleLst>
-      <a:effectStyleLst>
-        <a:effectStyle>
-          <a:effectLst>
-            <a:outerShdw blurRad="40000" dist="20000" dir="5400000" rotWithShape="0">
-              <a:srgbClr val="000000">
-                <a:alpha val="38000"/>
-              </a:srgbClr>
-            </a:outerShdw>
-          </a:effectLst>
-        </a:effectStyle>
-        <a:effectStyle>
-          <a:effectLst>
-            <a:outerShdw blurRad="40000" dist="23000" dir="5400000" rotWithShape="0">
-              <a:srgbClr val="000000">
-                <a:alpha val="35000"/>
-              </a:srgbClr>
-            </a:outerShdw>
-          </a:effectLst>
-        </a:effectStyle>
-        <a:effectStyle>
-          <a:effectLst>
-            <a:outerShdw blurRad="40000" dist="23000" dir="5400000" rotWithShape="0">
-              <a:srgbClr val="000000">
-                <a:alpha val="35000"/>
-              </a:srgbClr>
-            </a:outerShdw>
-          </a:effectLst>
-          <a:scene3d>
-            <a:camera prst="orthographicFront">
-              <a:rot lat="0" lon="0" rev="0"/>
-            </a:camera>
-            <a:lightRig rig="threePt" dir="t">
-              <a:rot lat="0" lon="0" rev="1200000"/>
-            </a:lightRig>
-          </a:scene3d>
-          <a:sp3d>
-            <a:bevelT w="63500" h="25400"/>
-          </a:sp3d>
-        </a:effectStyle>
-      </a:effectStyleLst>
-      <a:bgFillStyleLst>
-        <a:solidFill>
-          <a:schemeClr val="phClr"/>
-        </a:solidFill>
-        <a:gradFill rotWithShape="1">
-          <a:gsLst>
-            <a:gs pos="0">
-              <a:schemeClr val="phClr">
-                <a:tint val="40000"/>
-                <a:satMod val="350000"/>
-              </a:schemeClr>
-            </a:gs>
-            <a:gs pos="40000">
-              <a:schemeClr val="phClr">
-                <a:tint val="45000"/>
-                <a:shade val="99000"/>
-                <a:satMod val="350000"/>
-              </a:schemeClr>
-            </a:gs>
-            <a:gs pos="100000">
-              <a:schemeClr val="phClr">
-                <a:shade val="20000"/>
-                <a:satMod val="255000"/>
-              </a:schemeClr>
-            </a:gs>
-          </a:gsLst>
-          <a:path path="circle">
-            <a:fillToRect l="50000" t="-80000" r="50000" b="180000"/>
-          </a:path>
-        </a:gradFill>
-        <a:gradFill rotWithShape="1">
-          <a:gsLst>
-            <a:gs pos="0">
-              <a:schemeClr val="phClr">
-                <a:tint val="80000"/>
-                <a:satMod val="300000"/>
-              </a:schemeClr>
-            </a:gs>
-            <a:gs pos="100000">
-              <a:schemeClr val="phClr">
-                <a:shade val="30000"/>
-                <a:satMod val="200000"/>
-              </a:schemeClr>
-            </a:gs>
-          </a:gsLst>
-          <a:path path="circle">
-            <a:fillToRect l="50000" t="50000" r="50000" b="50000"/>
-          </a:path>
-        </a:gradFill>
-      </a:bgFillStyleLst>
-    </a:fmtScheme>
-  </a:themeElements>
-</a:theme>
 </file>
</xml_diff>